<commit_message>
Diapositivas para presentacion de Proyecto segunda parte añadida y se adjunta el diagrama de clases del juego en pdf
</commit_message>
<xml_diff>
--- a/Proyecto_Final_v1.0/PresentaciónProyecto2.pptx
+++ b/Proyecto_Final_v1.0/PresentaciónProyecto2.pptx
@@ -15,19 +15,27 @@
     <p:sldId id="302" r:id="rId9"/>
     <p:sldId id="264" r:id="rId10"/>
     <p:sldId id="265" r:id="rId11"/>
-    <p:sldId id="266" r:id="rId12"/>
-    <p:sldId id="268" r:id="rId13"/>
-    <p:sldId id="270" r:id="rId14"/>
-    <p:sldId id="304" r:id="rId15"/>
-    <p:sldId id="274" r:id="rId16"/>
-    <p:sldId id="275" r:id="rId17"/>
-    <p:sldId id="305" r:id="rId18"/>
-    <p:sldId id="303" r:id="rId19"/>
-    <p:sldId id="308" r:id="rId20"/>
-    <p:sldId id="306" r:id="rId21"/>
-    <p:sldId id="277" r:id="rId22"/>
-    <p:sldId id="288" r:id="rId23"/>
-    <p:sldId id="290" r:id="rId24"/>
+    <p:sldId id="309" r:id="rId12"/>
+    <p:sldId id="313" r:id="rId13"/>
+    <p:sldId id="312" r:id="rId14"/>
+    <p:sldId id="266" r:id="rId15"/>
+    <p:sldId id="268" r:id="rId16"/>
+    <p:sldId id="270" r:id="rId17"/>
+    <p:sldId id="304" r:id="rId18"/>
+    <p:sldId id="274" r:id="rId19"/>
+    <p:sldId id="275" r:id="rId20"/>
+    <p:sldId id="305" r:id="rId21"/>
+    <p:sldId id="303" r:id="rId22"/>
+    <p:sldId id="308" r:id="rId23"/>
+    <p:sldId id="306" r:id="rId24"/>
+    <p:sldId id="288" r:id="rId25"/>
+    <p:sldId id="314" r:id="rId26"/>
+    <p:sldId id="277" r:id="rId27"/>
+    <p:sldId id="315" r:id="rId28"/>
+    <p:sldId id="316" r:id="rId29"/>
+    <p:sldId id="317" r:id="rId30"/>
+    <p:sldId id="290" r:id="rId31"/>
+    <p:sldId id="318" r:id="rId32"/>
   </p:sldIdLst>
   <p:sldSz cx="12192000" cy="6858000"/>
   <p:notesSz cx="6858000" cy="9144000"/>
@@ -265,7 +273,7 @@
           <a:p>
             <a:fld id="{E8CB6E39-E5DE-4603-85D5-0FDBD2C1C118}" type="datetimeFigureOut">
               <a:rPr lang="es-EC" smtClean="0"/>
-              <a:t>12/8/2016</a:t>
+              <a:t>14/8/2016</a:t>
             </a:fld>
             <a:endParaRPr lang="es-EC"/>
           </a:p>
@@ -435,7 +443,7 @@
           <a:p>
             <a:fld id="{E8CB6E39-E5DE-4603-85D5-0FDBD2C1C118}" type="datetimeFigureOut">
               <a:rPr lang="es-EC" smtClean="0"/>
-              <a:t>12/8/2016</a:t>
+              <a:t>14/8/2016</a:t>
             </a:fld>
             <a:endParaRPr lang="es-EC"/>
           </a:p>
@@ -615,7 +623,7 @@
           <a:p>
             <a:fld id="{E8CB6E39-E5DE-4603-85D5-0FDBD2C1C118}" type="datetimeFigureOut">
               <a:rPr lang="es-EC" smtClean="0"/>
-              <a:t>12/8/2016</a:t>
+              <a:t>14/8/2016</a:t>
             </a:fld>
             <a:endParaRPr lang="es-EC"/>
           </a:p>
@@ -785,7 +793,7 @@
           <a:p>
             <a:fld id="{E8CB6E39-E5DE-4603-85D5-0FDBD2C1C118}" type="datetimeFigureOut">
               <a:rPr lang="es-EC" smtClean="0"/>
-              <a:t>12/8/2016</a:t>
+              <a:t>14/8/2016</a:t>
             </a:fld>
             <a:endParaRPr lang="es-EC"/>
           </a:p>
@@ -1031,7 +1039,7 @@
           <a:p>
             <a:fld id="{E8CB6E39-E5DE-4603-85D5-0FDBD2C1C118}" type="datetimeFigureOut">
               <a:rPr lang="es-EC" smtClean="0"/>
-              <a:t>12/8/2016</a:t>
+              <a:t>14/8/2016</a:t>
             </a:fld>
             <a:endParaRPr lang="es-EC"/>
           </a:p>
@@ -1263,7 +1271,7 @@
           <a:p>
             <a:fld id="{E8CB6E39-E5DE-4603-85D5-0FDBD2C1C118}" type="datetimeFigureOut">
               <a:rPr lang="es-EC" smtClean="0"/>
-              <a:t>12/8/2016</a:t>
+              <a:t>14/8/2016</a:t>
             </a:fld>
             <a:endParaRPr lang="es-EC"/>
           </a:p>
@@ -1630,7 +1638,7 @@
           <a:p>
             <a:fld id="{E8CB6E39-E5DE-4603-85D5-0FDBD2C1C118}" type="datetimeFigureOut">
               <a:rPr lang="es-EC" smtClean="0"/>
-              <a:t>12/8/2016</a:t>
+              <a:t>14/8/2016</a:t>
             </a:fld>
             <a:endParaRPr lang="es-EC"/>
           </a:p>
@@ -1748,7 +1756,7 @@
           <a:p>
             <a:fld id="{E8CB6E39-E5DE-4603-85D5-0FDBD2C1C118}" type="datetimeFigureOut">
               <a:rPr lang="es-EC" smtClean="0"/>
-              <a:t>12/8/2016</a:t>
+              <a:t>14/8/2016</a:t>
             </a:fld>
             <a:endParaRPr lang="es-EC"/>
           </a:p>
@@ -1843,7 +1851,7 @@
           <a:p>
             <a:fld id="{E8CB6E39-E5DE-4603-85D5-0FDBD2C1C118}" type="datetimeFigureOut">
               <a:rPr lang="es-EC" smtClean="0"/>
-              <a:t>12/8/2016</a:t>
+              <a:t>14/8/2016</a:t>
             </a:fld>
             <a:endParaRPr lang="es-EC"/>
           </a:p>
@@ -2120,7 +2128,7 @@
           <a:p>
             <a:fld id="{E8CB6E39-E5DE-4603-85D5-0FDBD2C1C118}" type="datetimeFigureOut">
               <a:rPr lang="es-EC" smtClean="0"/>
-              <a:t>12/8/2016</a:t>
+              <a:t>14/8/2016</a:t>
             </a:fld>
             <a:endParaRPr lang="es-EC"/>
           </a:p>
@@ -2373,7 +2381,7 @@
           <a:p>
             <a:fld id="{E8CB6E39-E5DE-4603-85D5-0FDBD2C1C118}" type="datetimeFigureOut">
               <a:rPr lang="es-EC" smtClean="0"/>
-              <a:t>12/8/2016</a:t>
+              <a:t>14/8/2016</a:t>
             </a:fld>
             <a:endParaRPr lang="es-EC"/>
           </a:p>
@@ -2586,7 +2594,7 @@
           <a:p>
             <a:fld id="{E8CB6E39-E5DE-4603-85D5-0FDBD2C1C118}" type="datetimeFigureOut">
               <a:rPr lang="es-EC" smtClean="0"/>
-              <a:t>12/8/2016</a:t>
+              <a:t>14/8/2016</a:t>
             </a:fld>
             <a:endParaRPr lang="es-EC"/>
           </a:p>
@@ -3679,8 +3687,8 @@
         </p:nvSpPr>
         <p:spPr>
           <a:xfrm>
-            <a:off x="1108629" y="857041"/>
-            <a:ext cx="9715501" cy="2677656"/>
+            <a:off x="985537" y="733246"/>
+            <a:ext cx="9715501" cy="6124754"/>
           </a:xfrm>
           <a:prstGeom prst="rect">
             <a:avLst/>
@@ -3753,6 +3761,36 @@
             <a:r>
               <a:rPr lang="es-ES" sz="2800" b="1" u="sng" dirty="0"/>
               <a:t>Resultados:</a:t>
+            </a:r>
+          </a:p>
+          <a:p>
+            <a:pPr marL="914400" lvl="1" indent="-457200" algn="just">
+              <a:buFont typeface="Arial" panose="020B0604020202020204" pitchFamily="34" charset="0"/>
+              <a:buChar char="•"/>
+            </a:pPr>
+            <a:r>
+              <a:rPr lang="es-ES" sz="2800" dirty="0"/>
+              <a:t>El juego comienza, mostrando una ventana con un fondo, el buceador y los atacantes con su palabra o carácter.</a:t>
+            </a:r>
+          </a:p>
+          <a:p>
+            <a:pPr marL="914400" lvl="1" indent="-457200" algn="just">
+              <a:buFont typeface="Arial" panose="020B0604020202020204" pitchFamily="34" charset="0"/>
+              <a:buChar char="•"/>
+            </a:pPr>
+            <a:r>
+              <a:rPr lang="es-ES" sz="2800" dirty="0"/>
+              <a:t>El jugador ira ganando puntos mientras ingrese la palabra o carácter respectiva de cualquier atacante que se este acercando al buceador.</a:t>
+            </a:r>
+          </a:p>
+          <a:p>
+            <a:pPr marL="914400" lvl="1" indent="-457200" algn="just">
+              <a:buFont typeface="Arial" panose="020B0604020202020204" pitchFamily="34" charset="0"/>
+              <a:buChar char="•"/>
+            </a:pPr>
+            <a:r>
+              <a:rPr lang="es-ES" sz="2800" dirty="0"/>
+              <a:t>El jugador puede ganar o perder vidas en el trascurso del juego, sino ingresa nada pierde una vida al momento en que el atacante toca al buceador.</a:t>
             </a:r>
           </a:p>
         </p:txBody>
@@ -3904,8 +3942,8 @@
         </p:nvSpPr>
         <p:spPr>
           <a:xfrm>
-            <a:off x="1205344" y="1246909"/>
-            <a:ext cx="9715501" cy="3970318"/>
+            <a:off x="1108629" y="857041"/>
+            <a:ext cx="9715501" cy="6124754"/>
           </a:xfrm>
           <a:prstGeom prst="rect">
             <a:avLst/>
@@ -3920,28 +3958,29 @@
           <a:p>
             <a:pPr algn="just"/>
             <a:r>
-              <a:rPr lang="es-ES" sz="3600" b="1" u="sng" dirty="0"/>
+              <a:rPr lang="es-ES" sz="2800" b="1" u="sng" dirty="0"/>
               <a:t>Caso de Uso 1: </a:t>
             </a:r>
             <a:r>
-              <a:rPr lang="es-ES" sz="3600" dirty="0"/>
+              <a:rPr lang="es-ES" sz="2800" dirty="0"/>
               <a:t>Iniciar juego</a:t>
             </a:r>
           </a:p>
           <a:p>
             <a:r>
-              <a:rPr lang="es-ES" sz="3600" b="1" u="sng" dirty="0"/>
-              <a:t>Escenario1.2: </a:t>
-            </a:r>
-            <a:r>
-              <a:rPr lang="es-ES" sz="3600" dirty="0"/>
-              <a:t>El inicio del juego es incorrecto.</a:t>
-            </a:r>
+              <a:rPr lang="es-ES" sz="2800" b="1" u="sng" dirty="0"/>
+              <a:t>Escenario1.1.1: </a:t>
+            </a:r>
+            <a:r>
+              <a:rPr lang="es-EC" sz="2800" dirty="0"/>
+              <a:t>El juego comienza a correr en nivel 1.</a:t>
+            </a:r>
+            <a:endParaRPr lang="es-ES" sz="2800" dirty="0"/>
           </a:p>
           <a:p>
             <a:pPr algn="just"/>
             <a:r>
-              <a:rPr lang="es-ES" sz="3600" b="1" u="sng" dirty="0"/>
+              <a:rPr lang="es-ES" sz="2800" b="1" u="sng" dirty="0"/>
               <a:t>Asunciones: </a:t>
             </a:r>
           </a:p>
@@ -3951,15 +3990,8 @@
               <a:buChar char="•"/>
             </a:pPr>
             <a:r>
-              <a:rPr lang="es-ES" sz="3600" dirty="0"/>
-              <a:t>El jugador hizo clic en otro botón.</a:t>
-            </a:r>
-          </a:p>
-          <a:p>
-            <a:pPr algn="just"/>
-            <a:r>
-              <a:rPr lang="es-ES" sz="3600" b="1" u="sng" dirty="0"/>
-              <a:t>Resultados:</a:t>
+              <a:rPr lang="es-ES" sz="2800" dirty="0"/>
+              <a:t>El jugador comienza a jugar en nivel 1.</a:t>
             </a:r>
           </a:p>
           <a:p>
@@ -3968,8 +4000,45 @@
               <a:buChar char="•"/>
             </a:pPr>
             <a:r>
-              <a:rPr lang="es-ES" sz="3600" dirty="0"/>
-              <a:t>No se puede iniciar el juego ya que el botón Jugar no fue presionado.</a:t>
+              <a:rPr lang="es-ES" sz="2800" dirty="0"/>
+              <a:t>El jugador empieza a ingresar por teclado las palabras del atacante que vaya apareciendo.</a:t>
+            </a:r>
+          </a:p>
+          <a:p>
+            <a:pPr algn="just"/>
+            <a:r>
+              <a:rPr lang="es-ES" sz="2800" b="1" u="sng" dirty="0"/>
+              <a:t>Resultados:</a:t>
+            </a:r>
+          </a:p>
+          <a:p>
+            <a:pPr marL="914400" lvl="1" indent="-457200" algn="just">
+              <a:buFont typeface="Arial" panose="020B0604020202020204" pitchFamily="34" charset="0"/>
+              <a:buChar char="•"/>
+            </a:pPr>
+            <a:r>
+              <a:rPr lang="es-ES" sz="2800" dirty="0"/>
+              <a:t>El juego comienza, mostrando una ventana con un fondo, el buceador y los atacantes con su palabra o carácter.</a:t>
+            </a:r>
+          </a:p>
+          <a:p>
+            <a:pPr marL="914400" lvl="1" indent="-457200" algn="just">
+              <a:buFont typeface="Arial" panose="020B0604020202020204" pitchFamily="34" charset="0"/>
+              <a:buChar char="•"/>
+            </a:pPr>
+            <a:r>
+              <a:rPr lang="es-ES" sz="2800" dirty="0"/>
+              <a:t>El jugador comienza a eliminar los atacantes digitando el carácter de cada palabra por medio del teclado.</a:t>
+            </a:r>
+          </a:p>
+          <a:p>
+            <a:pPr marL="914400" lvl="1" indent="-457200" algn="just">
+              <a:buFont typeface="Arial" panose="020B0604020202020204" pitchFamily="34" charset="0"/>
+              <a:buChar char="•"/>
+            </a:pPr>
+            <a:r>
+              <a:rPr lang="es-ES" sz="2800" dirty="0"/>
+              <a:t>El jugador gana 10 puntos si elimina a una piraña, 20 puntos si elimina a un tiburón blanco y 30 puntos si elimina a un tiburón negro.</a:t>
             </a:r>
           </a:p>
         </p:txBody>
@@ -3977,7 +4046,7 @@
     </p:spTree>
     <p:extLst>
       <p:ext uri="{BB962C8B-B14F-4D97-AF65-F5344CB8AC3E}">
-        <p14:creationId xmlns:p14="http://schemas.microsoft.com/office/powerpoint/2010/main" val="1926899956"/>
+        <p14:creationId xmlns:p14="http://schemas.microsoft.com/office/powerpoint/2010/main" val="4074629442"/>
       </p:ext>
     </p:extLst>
   </p:cSld>
@@ -4006,98 +4075,225 @@
       </p:grpSpPr>
       <p:sp>
         <p:nvSpPr>
-          <p:cNvPr id="2" name="Título 1"/>
-          <p:cNvSpPr>
-            <a:spLocks noGrp="1"/>
-          </p:cNvSpPr>
-          <p:nvPr>
-            <p:ph type="title"/>
-          </p:nvPr>
-        </p:nvSpPr>
-        <p:spPr/>
-        <p:txBody>
-          <a:bodyPr/>
+          <p:cNvPr id="6" name="AutoShape 4" descr="https://photos-2.dropbox.com/t/2/AADVKbXZN_BciGcZftNUb6FTCbTR0F5rtBOZquhn6VJB_g/12/208866478/png/32x32/1/_/1/2/Untitled%20Diagram.png/EK_4ws4EGAsgAigC/RqucL2BHwlWOXKxluo8r4SJrXLv0mWa8YzM8kTLzT88?size=800x600&amp;size_mode=3"/>
+          <p:cNvSpPr>
+            <a:spLocks noChangeAspect="1" noChangeArrowheads="1"/>
+          </p:cNvSpPr>
+          <p:nvPr/>
+        </p:nvSpPr>
+        <p:spPr bwMode="auto">
+          <a:xfrm>
+            <a:off x="307975" y="7937"/>
+            <a:ext cx="304800" cy="304801"/>
+          </a:xfrm>
+          <a:prstGeom prst="rect">
+            <a:avLst/>
+          </a:prstGeom>
+          <a:noFill/>
+          <a:extLst>
+            <a:ext uri="{909E8E84-426E-40DD-AFC4-6F175D3DCCD1}">
+              <a14:hiddenFill xmlns:a14="http://schemas.microsoft.com/office/drawing/2010/main">
+                <a:solidFill>
+                  <a:srgbClr val="FFFFFF"/>
+                </a:solidFill>
+              </a14:hiddenFill>
+            </a:ext>
+          </a:extLst>
+        </p:spPr>
+        <p:txBody>
+          <a:bodyPr vert="horz" wrap="square" lIns="91440" tIns="45720" rIns="91440" bIns="45720" numCol="1" anchor="t" anchorCtr="0" compatLnSpc="1">
+            <a:prstTxWarp prst="textNoShape">
+              <a:avLst/>
+            </a:prstTxWarp>
+          </a:bodyPr>
+          <a:lstStyle/>
+          <a:p>
+            <a:endParaRPr lang="es-ES"/>
+          </a:p>
+        </p:txBody>
+      </p:sp>
+      <p:sp>
+        <p:nvSpPr>
+          <p:cNvPr id="7" name="AutoShape 6" descr="https://photos-2.dropbox.com/t/2/AADVKbXZN_BciGcZftNUb6FTCbTR0F5rtBOZquhn6VJB_g/12/208866478/png/32x32/1/_/1/2/Untitled%20Diagram.png/EK_4ws4EGAsgAigC/RqucL2BHwlWOXKxluo8r4SJrXLv0mWa8YzM8kTLzT88?size=800x600&amp;size_mode=3"/>
+          <p:cNvSpPr>
+            <a:spLocks noChangeAspect="1" noChangeArrowheads="1"/>
+          </p:cNvSpPr>
+          <p:nvPr/>
+        </p:nvSpPr>
+        <p:spPr bwMode="auto">
+          <a:xfrm>
+            <a:off x="155575" y="-144463"/>
+            <a:ext cx="5590598" cy="5590616"/>
+          </a:xfrm>
+          <a:prstGeom prst="rect">
+            <a:avLst/>
+          </a:prstGeom>
+          <a:noFill/>
+          <a:extLst>
+            <a:ext uri="{909E8E84-426E-40DD-AFC4-6F175D3DCCD1}">
+              <a14:hiddenFill xmlns:a14="http://schemas.microsoft.com/office/drawing/2010/main">
+                <a:solidFill>
+                  <a:srgbClr val="FFFFFF"/>
+                </a:solidFill>
+              </a14:hiddenFill>
+            </a:ext>
+          </a:extLst>
+        </p:spPr>
+        <p:txBody>
+          <a:bodyPr vert="horz" wrap="square" lIns="91440" tIns="45720" rIns="91440" bIns="45720" numCol="1" anchor="t" anchorCtr="0" compatLnSpc="1">
+            <a:prstTxWarp prst="textNoShape">
+              <a:avLst/>
+            </a:prstTxWarp>
+          </a:bodyPr>
+          <a:lstStyle/>
+          <a:p>
+            <a:endParaRPr lang="es-ES"/>
+          </a:p>
+        </p:txBody>
+      </p:sp>
+      <p:sp>
+        <p:nvSpPr>
+          <p:cNvPr id="8" name="CuadroTexto 7"/>
+          <p:cNvSpPr txBox="1"/>
+          <p:nvPr/>
+        </p:nvSpPr>
+        <p:spPr>
+          <a:xfrm>
+            <a:off x="2311977" y="87600"/>
+            <a:ext cx="6868391" cy="769441"/>
+          </a:xfrm>
+          <a:prstGeom prst="rect">
+            <a:avLst/>
+          </a:prstGeom>
+          <a:noFill/>
+        </p:spPr>
+        <p:txBody>
+          <a:bodyPr wrap="square" rtlCol="0">
+            <a:spAutoFit/>
+          </a:bodyPr>
           <a:lstStyle/>
           <a:p>
             <a:pPr algn="ctr"/>
             <a:r>
-              <a:rPr lang="es-ES" b="1" dirty="0">
-                <a:latin typeface="+mn-lt"/>
-              </a:rPr>
-              <a:t>Escenarios</a:t>
-            </a:r>
-          </a:p>
-        </p:txBody>
-      </p:sp>
-      <p:sp>
-        <p:nvSpPr>
-          <p:cNvPr id="3" name="Marcador de contenido 2"/>
-          <p:cNvSpPr>
-            <a:spLocks noGrp="1"/>
-          </p:cNvSpPr>
-          <p:nvPr>
-            <p:ph idx="1"/>
-          </p:nvPr>
+              <a:rPr lang="es-ES" sz="4400" b="1" dirty="0"/>
+              <a:t>Especificación de Escenarios</a:t>
+            </a:r>
+            <a:endParaRPr lang="es-ES" sz="5400" dirty="0"/>
+          </a:p>
+        </p:txBody>
+      </p:sp>
+      <p:sp>
+        <p:nvSpPr>
+          <p:cNvPr id="9" name="CuadroTexto 8"/>
+          <p:cNvSpPr txBox="1"/>
+          <p:nvPr/>
         </p:nvSpPr>
         <p:spPr>
           <a:xfrm>
-            <a:off x="1939639" y="1784060"/>
-            <a:ext cx="8935883" cy="3889375"/>
-          </a:xfrm>
-        </p:spPr>
-        <p:txBody>
-          <a:bodyPr>
-            <a:normAutofit/>
+            <a:off x="1099837" y="988926"/>
+            <a:ext cx="9715501" cy="4832092"/>
+          </a:xfrm>
+          <a:prstGeom prst="rect">
+            <a:avLst/>
+          </a:prstGeom>
+          <a:noFill/>
+        </p:spPr>
+        <p:txBody>
+          <a:bodyPr wrap="square" rtlCol="0">
+            <a:spAutoFit/>
           </a:bodyPr>
           <a:lstStyle/>
           <a:p>
-            <a:pPr marL="0" indent="0">
-              <a:lnSpc>
-                <a:spcPct val="150000"/>
-              </a:lnSpc>
-              <a:buNone/>
-            </a:pPr>
-            <a:r>
-              <a:rPr lang="es-ES" sz="3200" dirty="0"/>
-              <a:t>2.1.- Se puede visualizar el TOP 10  correctamente.</a:t>
-            </a:r>
-          </a:p>
-          <a:p>
-            <a:pPr marL="0" indent="0">
-              <a:lnSpc>
-                <a:spcPct val="150000"/>
-              </a:lnSpc>
-              <a:buNone/>
-            </a:pPr>
-            <a:endParaRPr lang="es-ES" sz="3200" dirty="0"/>
-          </a:p>
-          <a:p>
-            <a:pPr marL="0" indent="0">
-              <a:lnSpc>
-                <a:spcPct val="150000"/>
-              </a:lnSpc>
-              <a:buNone/>
-            </a:pPr>
-            <a:r>
-              <a:rPr lang="es-ES" sz="3200" dirty="0"/>
-              <a:t>2.2.- La visualización del TOP 10 es incorrecta.</a:t>
-            </a:r>
-          </a:p>
-          <a:p>
-            <a:pPr marL="0" indent="0">
-              <a:lnSpc>
-                <a:spcPct val="150000"/>
-              </a:lnSpc>
-              <a:buNone/>
-            </a:pPr>
-            <a:endParaRPr lang="es-ES" sz="3200" dirty="0"/>
+            <a:pPr algn="just"/>
+            <a:r>
+              <a:rPr lang="es-ES" sz="2800" b="1" u="sng" dirty="0"/>
+              <a:t>Caso de Uso 1: </a:t>
+            </a:r>
+            <a:r>
+              <a:rPr lang="es-ES" sz="2800" dirty="0"/>
+              <a:t>Iniciar juego</a:t>
+            </a:r>
+          </a:p>
+          <a:p>
+            <a:r>
+              <a:rPr lang="es-ES" sz="2800" b="1" u="sng" dirty="0"/>
+              <a:t>Escenario1.1.2: </a:t>
+            </a:r>
+            <a:r>
+              <a:rPr lang="es-EC" sz="2800" dirty="0"/>
+              <a:t>El jugador no ingresa nada por teclado.</a:t>
+            </a:r>
+          </a:p>
+          <a:p>
+            <a:pPr algn="just"/>
+            <a:r>
+              <a:rPr lang="es-ES" sz="2800" b="1" u="sng" dirty="0"/>
+              <a:t>Asunciones: </a:t>
+            </a:r>
+          </a:p>
+          <a:p>
+            <a:pPr marL="914400" lvl="1" indent="-457200" algn="just">
+              <a:buFont typeface="Arial" panose="020B0604020202020204" pitchFamily="34" charset="0"/>
+              <a:buChar char="•"/>
+            </a:pPr>
+            <a:r>
+              <a:rPr lang="es-ES" sz="2800" dirty="0"/>
+              <a:t>El jugador comienza a jugar.</a:t>
+            </a:r>
+          </a:p>
+          <a:p>
+            <a:pPr marL="914400" lvl="1" indent="-457200" algn="just">
+              <a:buFont typeface="Arial" panose="020B0604020202020204" pitchFamily="34" charset="0"/>
+              <a:buChar char="•"/>
+            </a:pPr>
+            <a:r>
+              <a:rPr lang="es-ES" sz="2800" dirty="0"/>
+              <a:t>El jugador no ingresa ningún carácter.</a:t>
+            </a:r>
+          </a:p>
+          <a:p>
+            <a:pPr algn="just"/>
+            <a:r>
+              <a:rPr lang="es-ES" sz="2800" b="1" u="sng" dirty="0"/>
+              <a:t>Resultados:</a:t>
+            </a:r>
+          </a:p>
+          <a:p>
+            <a:pPr marL="914400" lvl="1" indent="-457200" algn="just">
+              <a:buFont typeface="Arial" panose="020B0604020202020204" pitchFamily="34" charset="0"/>
+              <a:buChar char="•"/>
+            </a:pPr>
+            <a:r>
+              <a:rPr lang="es-ES" sz="2800" dirty="0"/>
+              <a:t>El juego comienza, mostrando una ventana con un fondo, el buceador y los atacantes con su palabra o carácter.</a:t>
+            </a:r>
+          </a:p>
+          <a:p>
+            <a:pPr marL="914400" lvl="1" indent="-457200" algn="just">
+              <a:buFont typeface="Arial" panose="020B0604020202020204" pitchFamily="34" charset="0"/>
+              <a:buChar char="•"/>
+            </a:pPr>
+            <a:r>
+              <a:rPr lang="es-ES" sz="2800" dirty="0"/>
+              <a:t>El jugador no ingresa ningún carácter por el teclado.</a:t>
+            </a:r>
+          </a:p>
+          <a:p>
+            <a:pPr marL="914400" lvl="1" indent="-457200" algn="just">
+              <a:buFont typeface="Arial" panose="020B0604020202020204" pitchFamily="34" charset="0"/>
+              <a:buChar char="•"/>
+            </a:pPr>
+            <a:r>
+              <a:rPr lang="es-ES" sz="2800" dirty="0"/>
+              <a:t>El jugador pierde una vida (inicialmente solo dispone de tres vidas).</a:t>
+            </a:r>
           </a:p>
         </p:txBody>
       </p:sp>
     </p:spTree>
     <p:extLst>
       <p:ext uri="{BB962C8B-B14F-4D97-AF65-F5344CB8AC3E}">
-        <p14:creationId xmlns:p14="http://schemas.microsoft.com/office/powerpoint/2010/main" val="2089806326"/>
+        <p14:creationId xmlns:p14="http://schemas.microsoft.com/office/powerpoint/2010/main" val="4189220155"/>
       </p:ext>
     </p:extLst>
   </p:cSld>
@@ -4235,49 +4431,50 @@
       </p:sp>
       <p:sp>
         <p:nvSpPr>
-          <p:cNvPr id="2" name="Rectángulo 1"/>
-          <p:cNvSpPr/>
+          <p:cNvPr id="9" name="CuadroTexto 8"/>
+          <p:cNvSpPr txBox="1"/>
           <p:nvPr/>
         </p:nvSpPr>
         <p:spPr>
           <a:xfrm>
-            <a:off x="807396" y="857041"/>
-            <a:ext cx="10583694" cy="6001643"/>
+            <a:off x="888421" y="857041"/>
+            <a:ext cx="9715501" cy="6124754"/>
           </a:xfrm>
           <a:prstGeom prst="rect">
             <a:avLst/>
           </a:prstGeom>
-        </p:spPr>
-        <p:txBody>
-          <a:bodyPr wrap="square">
+          <a:noFill/>
+        </p:spPr>
+        <p:txBody>
+          <a:bodyPr wrap="square" rtlCol="0">
             <a:spAutoFit/>
           </a:bodyPr>
           <a:lstStyle/>
           <a:p>
             <a:pPr algn="just"/>
             <a:r>
-              <a:rPr lang="es-ES" sz="3200" b="1" u="sng" dirty="0"/>
-              <a:t>Caso de Uso 2: </a:t>
-            </a:r>
-            <a:r>
-              <a:rPr lang="es-ES" sz="3200" dirty="0"/>
-              <a:t>Ver TOP 10</a:t>
-            </a:r>
-          </a:p>
-          <a:p>
-            <a:r>
-              <a:rPr lang="es-ES" sz="3200" b="1" u="sng" dirty="0"/>
-              <a:t>Escenario2.1: </a:t>
-            </a:r>
-            <a:r>
-              <a:rPr lang="es-ES" sz="3200" dirty="0"/>
-              <a:t>Se puede visualizar el TOP 10  correctamente.</a:t>
+              <a:rPr lang="es-ES" sz="2800" b="1" u="sng" dirty="0"/>
+              <a:t>Caso de Uso 1: </a:t>
+            </a:r>
+            <a:r>
+              <a:rPr lang="es-ES" sz="2800" dirty="0"/>
+              <a:t>Iniciar juego</a:t>
+            </a:r>
+          </a:p>
+          <a:p>
+            <a:r>
+              <a:rPr lang="es-ES" sz="2800" b="1" u="sng" dirty="0"/>
+              <a:t>Escenario1.1.3: </a:t>
+            </a:r>
+            <a:r>
+              <a:rPr lang="es-EC" sz="2800" dirty="0"/>
+              <a:t>El jugador presiona la tecla ENTER.</a:t>
             </a:r>
           </a:p>
           <a:p>
             <a:pPr algn="just"/>
             <a:r>
-              <a:rPr lang="es-ES" sz="3200" b="1" u="sng" dirty="0"/>
+              <a:rPr lang="es-ES" sz="2800" b="1" u="sng" dirty="0"/>
               <a:t>Asunciones: </a:t>
             </a:r>
           </a:p>
@@ -4287,8 +4484,8 @@
               <a:buChar char="•"/>
             </a:pPr>
             <a:r>
-              <a:rPr lang="es-ES" sz="3200" dirty="0"/>
-              <a:t>El jugador decide conocer los mejores 10 jugadores y su puntaje obtenido.</a:t>
+              <a:rPr lang="es-ES" sz="2800" dirty="0"/>
+              <a:t>El jugador comienza a jugar.</a:t>
             </a:r>
           </a:p>
           <a:p>
@@ -4297,15 +4494,8 @@
               <a:buChar char="•"/>
             </a:pPr>
             <a:r>
-              <a:rPr lang="es-ES" sz="3200" dirty="0"/>
-              <a:t>El jugador hizo clic en el botón TOP 10.</a:t>
-            </a:r>
-          </a:p>
-          <a:p>
-            <a:pPr algn="just"/>
-            <a:r>
-              <a:rPr lang="es-ES" sz="3200" b="1" u="sng" dirty="0"/>
-              <a:t>Resultados:</a:t>
+              <a:rPr lang="es-ES" sz="2800" dirty="0"/>
+              <a:t>El jugador ya  a avanzado en el juego. </a:t>
             </a:r>
           </a:p>
           <a:p>
@@ -4314,16 +4504,15 @@
               <a:buChar char="•"/>
             </a:pPr>
             <a:r>
-              <a:rPr lang="es-ES" sz="3200" dirty="0"/>
-              <a:t>Se visualiza una nueva ventana donde aparecerá el nombre de los 10 mejores jugadores de </a:t>
-            </a:r>
-            <a:r>
-              <a:rPr lang="es-ES" sz="3200" dirty="0" err="1"/>
-              <a:t>TyperShark</a:t>
-            </a:r>
-            <a:r>
-              <a:rPr lang="es-ES" sz="3200" dirty="0"/>
-              <a:t>, con cada uno de sus puntajes, ordenados de mayor a menor.</a:t>
+              <a:rPr lang="es-ES" sz="2800" dirty="0"/>
+              <a:t>El jugador presiona la tecla ENTER.</a:t>
+            </a:r>
+          </a:p>
+          <a:p>
+            <a:pPr algn="just"/>
+            <a:r>
+              <a:rPr lang="es-ES" sz="2800" b="1" u="sng" dirty="0"/>
+              <a:t>Resultados:</a:t>
             </a:r>
           </a:p>
           <a:p>
@@ -4332,8 +4521,48 @@
               <a:buChar char="•"/>
             </a:pPr>
             <a:r>
-              <a:rPr lang="es-ES" sz="3200" dirty="0"/>
-              <a:t>Se puede regresar a la ventana principal o salir de juego con los botones Regresar y Salir respectivamente.</a:t>
+              <a:rPr lang="es-ES" sz="2800" dirty="0"/>
+              <a:t>El juego comienza, mostrando una ventana con un fondo, el buceador y los atacantes con su palabra o carácter.</a:t>
+            </a:r>
+          </a:p>
+          <a:p>
+            <a:pPr marL="914400" lvl="1" indent="-457200" algn="just">
+              <a:buFont typeface="Arial" panose="020B0604020202020204" pitchFamily="34" charset="0"/>
+              <a:buChar char="•"/>
+            </a:pPr>
+            <a:r>
+              <a:rPr lang="es-ES" sz="2800" dirty="0"/>
+              <a:t>El jugador ya ha ganado puntaje eliminando atacantes.</a:t>
+            </a:r>
+          </a:p>
+          <a:p>
+            <a:pPr marL="914400" lvl="1" indent="-457200" algn="just">
+              <a:buFont typeface="Arial" panose="020B0604020202020204" pitchFamily="34" charset="0"/>
+              <a:buChar char="•"/>
+            </a:pPr>
+            <a:r>
+              <a:rPr lang="es-ES" sz="2800" dirty="0"/>
+              <a:t>El jugador decide presionar la tecla ENTER.</a:t>
+            </a:r>
+          </a:p>
+          <a:p>
+            <a:pPr marL="914400" lvl="1" indent="-457200" algn="just">
+              <a:buFont typeface="Arial" panose="020B0604020202020204" pitchFamily="34" charset="0"/>
+              <a:buChar char="•"/>
+            </a:pPr>
+            <a:r>
+              <a:rPr lang="es-ES" sz="2800" dirty="0"/>
+              <a:t>Todos los atacantes son eliminados.</a:t>
+            </a:r>
+          </a:p>
+          <a:p>
+            <a:pPr marL="914400" lvl="1" indent="-457200" algn="just">
+              <a:buFont typeface="Arial" panose="020B0604020202020204" pitchFamily="34" charset="0"/>
+              <a:buChar char="•"/>
+            </a:pPr>
+            <a:r>
+              <a:rPr lang="es-ES" sz="2800" dirty="0"/>
+              <a:t>El puntaje disminuye 150 puntos por el ataque especial ejecutado con la tecla ENTER.</a:t>
             </a:r>
           </a:p>
         </p:txBody>
@@ -4341,7 +4570,7 @@
     </p:spTree>
     <p:extLst>
       <p:ext uri="{BB962C8B-B14F-4D97-AF65-F5344CB8AC3E}">
-        <p14:creationId xmlns:p14="http://schemas.microsoft.com/office/powerpoint/2010/main" val="2761518398"/>
+        <p14:creationId xmlns:p14="http://schemas.microsoft.com/office/powerpoint/2010/main" val="22787659"/>
       </p:ext>
     </p:extLst>
   </p:cSld>
@@ -4479,21 +4708,22 @@
       </p:sp>
       <p:sp>
         <p:nvSpPr>
-          <p:cNvPr id="2" name="Rectángulo 1"/>
-          <p:cNvSpPr/>
+          <p:cNvPr id="9" name="CuadroTexto 8"/>
+          <p:cNvSpPr txBox="1"/>
           <p:nvPr/>
         </p:nvSpPr>
         <p:spPr>
           <a:xfrm>
-            <a:off x="1177048" y="993147"/>
-            <a:ext cx="8453336" cy="5078313"/>
+            <a:off x="1205344" y="1246909"/>
+            <a:ext cx="9715501" cy="3970318"/>
           </a:xfrm>
           <a:prstGeom prst="rect">
             <a:avLst/>
           </a:prstGeom>
-        </p:spPr>
-        <p:txBody>
-          <a:bodyPr wrap="square">
+          <a:noFill/>
+        </p:spPr>
+        <p:txBody>
+          <a:bodyPr wrap="square" rtlCol="0">
             <a:spAutoFit/>
           </a:bodyPr>
           <a:lstStyle/>
@@ -4501,21 +4731,21 @@
             <a:pPr algn="just"/>
             <a:r>
               <a:rPr lang="es-ES" sz="3600" b="1" u="sng" dirty="0"/>
-              <a:t>Caso de Uso 2: </a:t>
+              <a:t>Caso de Uso 1: </a:t>
             </a:r>
             <a:r>
               <a:rPr lang="es-ES" sz="3600" dirty="0"/>
-              <a:t>Ver TOP 10</a:t>
+              <a:t>Iniciar juego</a:t>
             </a:r>
           </a:p>
           <a:p>
             <a:r>
               <a:rPr lang="es-ES" sz="3600" b="1" u="sng" dirty="0"/>
-              <a:t>Escenario2.2: </a:t>
+              <a:t>Escenario1.2: </a:t>
             </a:r>
             <a:r>
               <a:rPr lang="es-ES" sz="3600" dirty="0"/>
-              <a:t>La visualización del TOP 10 es incorrecta.</a:t>
+              <a:t>El inicio del juego es incorrecto.</a:t>
             </a:r>
           </a:p>
           <a:p>
@@ -4549,7 +4779,7 @@
             </a:pPr>
             <a:r>
               <a:rPr lang="es-ES" sz="3600" dirty="0"/>
-              <a:t>No se puede ver los mejores jugadores y su puntaje ya que el botón TOP 10 no fue presionado.</a:t>
+              <a:t>No se puede iniciar el juego ya que el botón Jugar no fue presionado.</a:t>
             </a:r>
           </a:p>
         </p:txBody>
@@ -4557,7 +4787,7 @@
     </p:spTree>
     <p:extLst>
       <p:ext uri="{BB962C8B-B14F-4D97-AF65-F5344CB8AC3E}">
-        <p14:creationId xmlns:p14="http://schemas.microsoft.com/office/powerpoint/2010/main" val="3486558864"/>
+        <p14:creationId xmlns:p14="http://schemas.microsoft.com/office/powerpoint/2010/main" val="1926899956"/>
       </p:ext>
     </p:extLst>
   </p:cSld>
@@ -4621,8 +4851,8 @@
         </p:nvSpPr>
         <p:spPr>
           <a:xfrm>
-            <a:off x="1453256" y="2046707"/>
-            <a:ext cx="9684914" cy="3889375"/>
+            <a:off x="1939639" y="1784060"/>
+            <a:ext cx="8935883" cy="3889375"/>
           </a:xfrm>
         </p:spPr>
         <p:txBody>
@@ -4639,7 +4869,7 @@
             </a:pPr>
             <a:r>
               <a:rPr lang="es-ES" sz="3200" dirty="0"/>
-              <a:t>3.1.- Se puede visualizar las instrucciones correctamente.</a:t>
+              <a:t>2.1.- Se puede visualizar el TOP 10  correctamente.</a:t>
             </a:r>
           </a:p>
           <a:p>
@@ -4660,15 +4890,24 @@
             </a:pPr>
             <a:r>
               <a:rPr lang="es-ES" sz="3200" dirty="0"/>
-              <a:t>3.2.- La visualización de las instrucciones es incorrecta.</a:t>
-            </a:r>
+              <a:t>2.2.- La visualización del TOP 10 es incorrecta.</a:t>
+            </a:r>
+          </a:p>
+          <a:p>
+            <a:pPr marL="0" indent="0">
+              <a:lnSpc>
+                <a:spcPct val="150000"/>
+              </a:lnSpc>
+              <a:buNone/>
+            </a:pPr>
+            <a:endParaRPr lang="es-ES" sz="3200" dirty="0"/>
           </a:p>
         </p:txBody>
       </p:sp>
     </p:spTree>
     <p:extLst>
       <p:ext uri="{BB962C8B-B14F-4D97-AF65-F5344CB8AC3E}">
-        <p14:creationId xmlns:p14="http://schemas.microsoft.com/office/powerpoint/2010/main" val="4157399758"/>
+        <p14:creationId xmlns:p14="http://schemas.microsoft.com/office/powerpoint/2010/main" val="2089806326"/>
       </p:ext>
     </p:extLst>
   </p:cSld>
@@ -4806,50 +5045,49 @@
       </p:sp>
       <p:sp>
         <p:nvSpPr>
-          <p:cNvPr id="9" name="CuadroTexto 8"/>
-          <p:cNvSpPr txBox="1"/>
+          <p:cNvPr id="2" name="Rectángulo 1"/>
+          <p:cNvSpPr/>
           <p:nvPr/>
         </p:nvSpPr>
         <p:spPr>
           <a:xfrm>
-            <a:off x="906032" y="754296"/>
-            <a:ext cx="10212683" cy="5909310"/>
+            <a:off x="807396" y="857041"/>
+            <a:ext cx="10583694" cy="6001643"/>
           </a:xfrm>
           <a:prstGeom prst="rect">
             <a:avLst/>
           </a:prstGeom>
-          <a:noFill/>
-        </p:spPr>
-        <p:txBody>
-          <a:bodyPr wrap="square" rtlCol="0">
+        </p:spPr>
+        <p:txBody>
+          <a:bodyPr wrap="square">
             <a:spAutoFit/>
           </a:bodyPr>
           <a:lstStyle/>
           <a:p>
             <a:pPr algn="just"/>
             <a:r>
-              <a:rPr lang="es-ES" sz="3000" b="1" u="sng" dirty="0"/>
-              <a:t>Caso de Uso 3: </a:t>
-            </a:r>
-            <a:r>
-              <a:rPr lang="es-ES" sz="3000" dirty="0"/>
-              <a:t>Leer instrucciones</a:t>
-            </a:r>
-          </a:p>
-          <a:p>
-            <a:r>
-              <a:rPr lang="es-ES" sz="3000" b="1" u="sng" dirty="0"/>
-              <a:t>Escenario3.1: </a:t>
-            </a:r>
-            <a:r>
-              <a:rPr lang="es-ES" sz="2800" dirty="0"/>
-              <a:t>Se puede visualizar las instrucciones correctamente.</a:t>
+              <a:rPr lang="es-ES" sz="3200" b="1" u="sng" dirty="0"/>
+              <a:t>Caso de Uso 2: </a:t>
+            </a:r>
+            <a:r>
+              <a:rPr lang="es-ES" sz="3200" dirty="0"/>
+              <a:t>Ver TOP 10</a:t>
+            </a:r>
+          </a:p>
+          <a:p>
+            <a:r>
+              <a:rPr lang="es-ES" sz="3200" b="1" u="sng" dirty="0"/>
+              <a:t>Escenario2.1: </a:t>
+            </a:r>
+            <a:r>
+              <a:rPr lang="es-ES" sz="3200" dirty="0"/>
+              <a:t>Se puede visualizar el TOP 10  correctamente.</a:t>
             </a:r>
           </a:p>
           <a:p>
             <a:pPr algn="just"/>
             <a:r>
-              <a:rPr lang="es-ES" sz="3000" b="1" u="sng" dirty="0"/>
+              <a:rPr lang="es-ES" sz="3200" b="1" u="sng" dirty="0"/>
               <a:t>Asunciones: </a:t>
             </a:r>
           </a:p>
@@ -4859,16 +5097,8 @@
               <a:buChar char="•"/>
             </a:pPr>
             <a:r>
-              <a:rPr lang="es-ES" sz="3000" dirty="0"/>
-              <a:t>El jugador decide conocer primero las instrucciones de </a:t>
-            </a:r>
-            <a:r>
-              <a:rPr lang="es-ES" sz="3000" dirty="0" err="1"/>
-              <a:t>TyperShark</a:t>
-            </a:r>
-            <a:r>
-              <a:rPr lang="es-ES" sz="3000" dirty="0"/>
-              <a:t>.</a:t>
+              <a:rPr lang="es-ES" sz="3200" dirty="0"/>
+              <a:t>El jugador decide conocer los mejores 10 jugadores y su puntaje obtenido.</a:t>
             </a:r>
           </a:p>
           <a:p>
@@ -4877,14 +5107,14 @@
               <a:buChar char="•"/>
             </a:pPr>
             <a:r>
-              <a:rPr lang="es-ES" sz="3000" dirty="0"/>
-              <a:t>El jugador hizo clic en el botón Instrucciones.</a:t>
+              <a:rPr lang="es-ES" sz="3200" dirty="0"/>
+              <a:t>El jugador hizo clic en el botón TOP 10.</a:t>
             </a:r>
           </a:p>
           <a:p>
             <a:pPr algn="just"/>
             <a:r>
-              <a:rPr lang="es-ES" sz="3000" b="1" u="sng" dirty="0"/>
+              <a:rPr lang="es-ES" sz="3200" b="1" u="sng" dirty="0"/>
               <a:t>Resultados:</a:t>
             </a:r>
           </a:p>
@@ -4894,16 +5124,16 @@
               <a:buChar char="•"/>
             </a:pPr>
             <a:r>
-              <a:rPr lang="es-ES" sz="2800" dirty="0"/>
-              <a:t>Se visualiza una nueva ventana donde aparecerá las instrucciones del juego </a:t>
-            </a:r>
-            <a:r>
-              <a:rPr lang="es-ES" sz="2800" dirty="0" err="1"/>
+              <a:rPr lang="es-ES" sz="3200" dirty="0"/>
+              <a:t>Se visualiza una nueva ventana donde aparecerá el nombre de los 10 mejores jugadores de </a:t>
+            </a:r>
+            <a:r>
+              <a:rPr lang="es-ES" sz="3200" dirty="0" err="1"/>
               <a:t>TyperShark</a:t>
             </a:r>
             <a:r>
-              <a:rPr lang="es-ES" sz="2800" dirty="0"/>
-              <a:t> para que el usuario conozca el juego y como ganar o perder puntos.</a:t>
+              <a:rPr lang="es-ES" sz="3200" dirty="0"/>
+              <a:t>, con cada uno de sus puntajes, ordenados de mayor a menor.</a:t>
             </a:r>
           </a:p>
           <a:p>
@@ -4911,15 +5141,8 @@
               <a:buFont typeface="Arial" panose="020B0604020202020204" pitchFamily="34" charset="0"/>
               <a:buChar char="•"/>
             </a:pPr>
-            <a:endParaRPr lang="es-ES" sz="2800" dirty="0"/>
-          </a:p>
-          <a:p>
-            <a:pPr marL="914400" lvl="1" indent="-457200" algn="just">
-              <a:buFont typeface="Arial" panose="020B0604020202020204" pitchFamily="34" charset="0"/>
-              <a:buChar char="•"/>
-            </a:pPr>
-            <a:r>
-              <a:rPr lang="es-ES" sz="2800" dirty="0"/>
+            <a:r>
+              <a:rPr lang="es-ES" sz="3200" dirty="0"/>
               <a:t>Se puede regresar a la ventana principal o salir de juego con los botones Regresar y Salir respectivamente.</a:t>
             </a:r>
           </a:p>
@@ -4928,7 +5151,7 @@
     </p:spTree>
     <p:extLst>
       <p:ext uri="{BB962C8B-B14F-4D97-AF65-F5344CB8AC3E}">
-        <p14:creationId xmlns:p14="http://schemas.microsoft.com/office/powerpoint/2010/main" val="1798910164"/>
+        <p14:creationId xmlns:p14="http://schemas.microsoft.com/office/powerpoint/2010/main" val="2761518398"/>
       </p:ext>
     </p:extLst>
   </p:cSld>
@@ -5072,8 +5295,8 @@
         </p:nvSpPr>
         <p:spPr>
           <a:xfrm>
-            <a:off x="992221" y="954236"/>
-            <a:ext cx="9426101" cy="5078313"/>
+            <a:off x="1177048" y="993147"/>
+            <a:ext cx="8453336" cy="5078313"/>
           </a:xfrm>
           <a:prstGeom prst="rect">
             <a:avLst/>
@@ -5088,21 +5311,21 @@
             <a:pPr algn="just"/>
             <a:r>
               <a:rPr lang="es-ES" sz="3600" b="1" u="sng" dirty="0"/>
-              <a:t>Caso de Uso 3: </a:t>
+              <a:t>Caso de Uso 2: </a:t>
             </a:r>
             <a:r>
               <a:rPr lang="es-ES" sz="3600" dirty="0"/>
-              <a:t>Leer Instrucciones</a:t>
+              <a:t>Ver TOP 10</a:t>
             </a:r>
           </a:p>
           <a:p>
             <a:r>
               <a:rPr lang="es-ES" sz="3600" b="1" u="sng" dirty="0"/>
-              <a:t>Escenario3.2: </a:t>
+              <a:t>Escenario2.2: </a:t>
             </a:r>
             <a:r>
               <a:rPr lang="es-ES" sz="3600" dirty="0"/>
-              <a:t>La visualización de las instrucciones es incorrecta.</a:t>
+              <a:t>La visualización del TOP 10 es incorrecta.</a:t>
             </a:r>
           </a:p>
           <a:p>
@@ -5136,7 +5359,7 @@
             </a:pPr>
             <a:r>
               <a:rPr lang="es-ES" sz="3600" dirty="0"/>
-              <a:t>No se puede ver las instrucciones del juego ya que el botón Instrucciones no fue presionado.</a:t>
+              <a:t>No se puede ver los mejores jugadores y su puntaje ya que el botón TOP 10 no fue presionado.</a:t>
             </a:r>
           </a:p>
         </p:txBody>
@@ -5144,7 +5367,7 @@
     </p:spTree>
     <p:extLst>
       <p:ext uri="{BB962C8B-B14F-4D97-AF65-F5344CB8AC3E}">
-        <p14:creationId xmlns:p14="http://schemas.microsoft.com/office/powerpoint/2010/main" val="2746309885"/>
+        <p14:creationId xmlns:p14="http://schemas.microsoft.com/office/powerpoint/2010/main" val="3486558864"/>
       </p:ext>
     </p:extLst>
   </p:cSld>
@@ -5226,7 +5449,7 @@
             </a:pPr>
             <a:r>
               <a:rPr lang="es-ES" sz="3200" dirty="0"/>
-              <a:t>4.1.- Se puede salir del juego correctamente.</a:t>
+              <a:t>3.1.- Se puede visualizar las instrucciones correctamente.</a:t>
             </a:r>
           </a:p>
           <a:p>
@@ -5247,7 +5470,7 @@
             </a:pPr>
             <a:r>
               <a:rPr lang="es-ES" sz="3200" dirty="0"/>
-              <a:t>4.2.- La salida del juego es incorrecta.</a:t>
+              <a:t>3.2.- La visualización de las instrucciones es incorrecta.</a:t>
             </a:r>
           </a:p>
         </p:txBody>
@@ -5255,7 +5478,7 @@
     </p:spTree>
     <p:extLst>
       <p:ext uri="{BB962C8B-B14F-4D97-AF65-F5344CB8AC3E}">
-        <p14:creationId xmlns:p14="http://schemas.microsoft.com/office/powerpoint/2010/main" val="1593641814"/>
+        <p14:creationId xmlns:p14="http://schemas.microsoft.com/office/powerpoint/2010/main" val="4157399758"/>
       </p:ext>
     </p:extLst>
   </p:cSld>
@@ -5399,8 +5622,8 @@
         </p:nvSpPr>
         <p:spPr>
           <a:xfrm>
-            <a:off x="1129769" y="1089104"/>
-            <a:ext cx="8743806" cy="4524315"/>
+            <a:off x="906032" y="754296"/>
+            <a:ext cx="10212683" cy="5909310"/>
           </a:xfrm>
           <a:prstGeom prst="rect">
             <a:avLst/>
@@ -5415,28 +5638,28 @@
           <a:p>
             <a:pPr algn="just"/>
             <a:r>
-              <a:rPr lang="es-ES" sz="3600" b="1" u="sng" dirty="0"/>
-              <a:t>Caso de Uso 4: </a:t>
-            </a:r>
-            <a:r>
-              <a:rPr lang="es-ES" sz="3600" dirty="0"/>
-              <a:t>Salir del juego</a:t>
-            </a:r>
-          </a:p>
-          <a:p>
-            <a:r>
-              <a:rPr lang="es-ES" sz="3600" b="1" u="sng" dirty="0"/>
-              <a:t>Escenario4.2: </a:t>
-            </a:r>
-            <a:r>
-              <a:rPr lang="es-ES" sz="3600" dirty="0"/>
-              <a:t>Se puede salir del juego correctamente.</a:t>
+              <a:rPr lang="es-ES" sz="3000" b="1" u="sng" dirty="0"/>
+              <a:t>Caso de Uso 3: </a:t>
+            </a:r>
+            <a:r>
+              <a:rPr lang="es-ES" sz="3000" dirty="0"/>
+              <a:t>Leer instrucciones</a:t>
+            </a:r>
+          </a:p>
+          <a:p>
+            <a:r>
+              <a:rPr lang="es-ES" sz="3000" b="1" u="sng" dirty="0"/>
+              <a:t>Escenario3.1: </a:t>
+            </a:r>
+            <a:r>
+              <a:rPr lang="es-ES" sz="2800" dirty="0"/>
+              <a:t>Se puede visualizar las instrucciones correctamente.</a:t>
             </a:r>
           </a:p>
           <a:p>
             <a:pPr algn="just"/>
             <a:r>
-              <a:rPr lang="es-ES" sz="3600" b="1" u="sng" dirty="0"/>
+              <a:rPr lang="es-ES" sz="3000" b="1" u="sng" dirty="0"/>
               <a:t>Asunciones: </a:t>
             </a:r>
           </a:p>
@@ -5446,15 +5669,15 @@
               <a:buChar char="•"/>
             </a:pPr>
             <a:r>
-              <a:rPr lang="es-ES" sz="3600" dirty="0"/>
-              <a:t>El jugador decide salir de </a:t>
-            </a:r>
-            <a:r>
-              <a:rPr lang="es-ES" sz="3600" dirty="0" err="1"/>
+              <a:rPr lang="es-ES" sz="3000" dirty="0"/>
+              <a:t>El jugador decide conocer primero las instrucciones de </a:t>
+            </a:r>
+            <a:r>
+              <a:rPr lang="es-ES" sz="3000" dirty="0" err="1"/>
               <a:t>TyperShark</a:t>
             </a:r>
             <a:r>
-              <a:rPr lang="es-ES" sz="3600" dirty="0"/>
+              <a:rPr lang="es-ES" sz="3000" dirty="0"/>
               <a:t>.</a:t>
             </a:r>
           </a:p>
@@ -5464,14 +5687,14 @@
               <a:buChar char="•"/>
             </a:pPr>
             <a:r>
-              <a:rPr lang="es-ES" sz="3600" dirty="0"/>
-              <a:t>El jugador hizo clic en el botón Salir.</a:t>
+              <a:rPr lang="es-ES" sz="3000" dirty="0"/>
+              <a:t>El jugador hizo clic en el botón Instrucciones.</a:t>
             </a:r>
           </a:p>
           <a:p>
             <a:pPr algn="just"/>
             <a:r>
-              <a:rPr lang="es-ES" sz="3600" b="1" u="sng" dirty="0"/>
+              <a:rPr lang="es-ES" sz="3000" b="1" u="sng" dirty="0"/>
               <a:t>Resultados:</a:t>
             </a:r>
           </a:p>
@@ -5481,8 +5704,33 @@
               <a:buChar char="•"/>
             </a:pPr>
             <a:r>
-              <a:rPr lang="es-ES" sz="3600" dirty="0"/>
-              <a:t>Se cierra la ventana principal del juego.</a:t>
+              <a:rPr lang="es-ES" sz="2800" dirty="0"/>
+              <a:t>Se visualiza una nueva ventana donde aparecerá las instrucciones del juego </a:t>
+            </a:r>
+            <a:r>
+              <a:rPr lang="es-ES" sz="2800" dirty="0" err="1"/>
+              <a:t>TyperShark</a:t>
+            </a:r>
+            <a:r>
+              <a:rPr lang="es-ES" sz="2800" dirty="0"/>
+              <a:t> para que el usuario conozca el juego y como ganar o perder puntos.</a:t>
+            </a:r>
+          </a:p>
+          <a:p>
+            <a:pPr marL="914400" lvl="1" indent="-457200" algn="just">
+              <a:buFont typeface="Arial" panose="020B0604020202020204" pitchFamily="34" charset="0"/>
+              <a:buChar char="•"/>
+            </a:pPr>
+            <a:endParaRPr lang="es-ES" sz="2800" dirty="0"/>
+          </a:p>
+          <a:p>
+            <a:pPr marL="914400" lvl="1" indent="-457200" algn="just">
+              <a:buFont typeface="Arial" panose="020B0604020202020204" pitchFamily="34" charset="0"/>
+              <a:buChar char="•"/>
+            </a:pPr>
+            <a:r>
+              <a:rPr lang="es-ES" sz="2800" dirty="0"/>
+              <a:t>Se puede regresar a la ventana principal o salir de juego con los botones Regresar y Salir respectivamente.</a:t>
             </a:r>
           </a:p>
         </p:txBody>
@@ -5490,7 +5738,7 @@
     </p:spTree>
     <p:extLst>
       <p:ext uri="{BB962C8B-B14F-4D97-AF65-F5344CB8AC3E}">
-        <p14:creationId xmlns:p14="http://schemas.microsoft.com/office/powerpoint/2010/main" val="2246678701"/>
+        <p14:creationId xmlns:p14="http://schemas.microsoft.com/office/powerpoint/2010/main" val="1798910164"/>
       </p:ext>
     </p:extLst>
   </p:cSld>
@@ -5719,7 +5967,7 @@
         <p:spPr>
           <a:xfrm>
             <a:off x="992221" y="954236"/>
-            <a:ext cx="9426101" cy="5632311"/>
+            <a:ext cx="9426101" cy="5078313"/>
           </a:xfrm>
           <a:prstGeom prst="rect">
             <a:avLst/>
@@ -5734,30 +5982,29 @@
             <a:pPr algn="just"/>
             <a:r>
               <a:rPr lang="es-ES" sz="3600" b="1" u="sng" dirty="0"/>
-              <a:t>Caso de Uso 4: </a:t>
+              <a:t>Caso de Uso 3: </a:t>
             </a:r>
             <a:r>
               <a:rPr lang="es-ES" sz="3600" dirty="0"/>
-              <a:t>Salir del juego</a:t>
+              <a:t>Leer Instrucciones</a:t>
             </a:r>
           </a:p>
           <a:p>
             <a:r>
               <a:rPr lang="es-ES" sz="3600" b="1" u="sng" dirty="0"/>
-              <a:t>Escenario4.2: </a:t>
+              <a:t>Escenario3.2: </a:t>
             </a:r>
             <a:r>
               <a:rPr lang="es-ES" sz="3600" dirty="0"/>
-              <a:t>La salida del juego es incorrecta.</a:t>
+              <a:t>La visualización de las instrucciones es incorrecta.</a:t>
             </a:r>
           </a:p>
           <a:p>
             <a:pPr algn="just"/>
             <a:r>
               <a:rPr lang="es-ES" sz="3600" b="1" u="sng" dirty="0"/>
-              <a:t>Asunciones:</a:t>
-            </a:r>
-            <a:endParaRPr lang="es-ES" sz="3600" dirty="0"/>
+              <a:t>Asunciones: </a:t>
+            </a:r>
           </a:p>
           <a:p>
             <a:pPr marL="914400" lvl="1" indent="-457200" algn="just">
@@ -5770,40 +6017,20 @@
             </a:r>
           </a:p>
           <a:p>
+            <a:pPr algn="just"/>
+            <a:r>
+              <a:rPr lang="es-ES" sz="3600" b="1" u="sng" dirty="0"/>
+              <a:t>Resultados:</a:t>
+            </a:r>
+          </a:p>
+          <a:p>
             <a:pPr marL="914400" lvl="1" indent="-457200" algn="just">
               <a:buFont typeface="Arial" panose="020B0604020202020204" pitchFamily="34" charset="0"/>
               <a:buChar char="•"/>
             </a:pPr>
             <a:r>
               <a:rPr lang="es-ES" sz="3600" dirty="0"/>
-              <a:t>Que se haya quedado un hilo activado.</a:t>
-            </a:r>
-          </a:p>
-          <a:p>
-            <a:pPr algn="just"/>
-            <a:r>
-              <a:rPr lang="es-ES" sz="3600" b="1" u="sng" dirty="0"/>
-              <a:t>Resultados:</a:t>
-            </a:r>
-          </a:p>
-          <a:p>
-            <a:pPr marL="914400" lvl="1" indent="-457200" algn="just">
-              <a:buFont typeface="Arial" panose="020B0604020202020204" pitchFamily="34" charset="0"/>
-              <a:buChar char="•"/>
-            </a:pPr>
-            <a:r>
-              <a:rPr lang="es-ES" sz="3600" dirty="0"/>
-              <a:t>No se puede salir del juego ya que el botón Salir no fue presionado.</a:t>
-            </a:r>
-          </a:p>
-          <a:p>
-            <a:pPr marL="914400" lvl="1" indent="-457200" algn="just">
-              <a:buFont typeface="Arial" panose="020B0604020202020204" pitchFamily="34" charset="0"/>
-              <a:buChar char="•"/>
-            </a:pPr>
-            <a:r>
-              <a:rPr lang="es-ES" sz="3600" dirty="0"/>
-              <a:t>Puede generar un error de compilación o una excepción.</a:t>
+              <a:t>No se puede ver las instrucciones del juego ya que el botón Instrucciones no fue presionado.</a:t>
             </a:r>
           </a:p>
         </p:txBody>
@@ -5811,7 +6038,7 @@
     </p:spTree>
     <p:extLst>
       <p:ext uri="{BB962C8B-B14F-4D97-AF65-F5344CB8AC3E}">
-        <p14:creationId xmlns:p14="http://schemas.microsoft.com/office/powerpoint/2010/main" val="1413300860"/>
+        <p14:creationId xmlns:p14="http://schemas.microsoft.com/office/powerpoint/2010/main" val="2746309885"/>
       </p:ext>
     </p:extLst>
   </p:cSld>
@@ -5840,43 +6067,81 @@
       </p:grpSpPr>
       <p:sp>
         <p:nvSpPr>
-          <p:cNvPr id="2" name="CuadroTexto 1"/>
-          <p:cNvSpPr txBox="1"/>
-          <p:nvPr/>
+          <p:cNvPr id="2" name="Título 1"/>
+          <p:cNvSpPr>
+            <a:spLocks noGrp="1"/>
+          </p:cNvSpPr>
+          <p:nvPr>
+            <p:ph type="title"/>
+          </p:nvPr>
+        </p:nvSpPr>
+        <p:spPr/>
+        <p:txBody>
+          <a:bodyPr/>
+          <a:lstStyle/>
+          <a:p>
+            <a:pPr algn="ctr"/>
+            <a:r>
+              <a:rPr lang="es-ES" b="1" dirty="0">
+                <a:latin typeface="+mn-lt"/>
+              </a:rPr>
+              <a:t>Escenarios</a:t>
+            </a:r>
+          </a:p>
+        </p:txBody>
+      </p:sp>
+      <p:sp>
+        <p:nvSpPr>
+          <p:cNvPr id="3" name="Marcador de contenido 2"/>
+          <p:cNvSpPr>
+            <a:spLocks noGrp="1"/>
+          </p:cNvSpPr>
+          <p:nvPr>
+            <p:ph idx="1"/>
+          </p:nvPr>
         </p:nvSpPr>
         <p:spPr>
           <a:xfrm>
-            <a:off x="1758462" y="1406769"/>
-            <a:ext cx="8607669" cy="3816429"/>
-          </a:xfrm>
-          <a:prstGeom prst="rect">
-            <a:avLst/>
-          </a:prstGeom>
-          <a:noFill/>
-        </p:spPr>
-        <p:txBody>
-          <a:bodyPr wrap="square" rtlCol="0">
-            <a:spAutoFit/>
+            <a:off x="1453256" y="2046707"/>
+            <a:ext cx="9684914" cy="3889375"/>
+          </a:xfrm>
+        </p:spPr>
+        <p:txBody>
+          <a:bodyPr>
+            <a:normAutofit/>
           </a:bodyPr>
           <a:lstStyle/>
           <a:p>
-            <a:pPr algn="ctr"/>
-            <a:r>
-              <a:rPr lang="es-EC" sz="9600" dirty="0"/>
-              <a:t>DIAGRAMAS DE SECUENCIA</a:t>
-            </a:r>
-          </a:p>
-          <a:p>
-            <a:endParaRPr lang="es-EC" dirty="0"/>
-          </a:p>
-          <a:p>
-            <a:pPr marL="457200" indent="-457200">
-              <a:buFont typeface="Arial" panose="020B0604020202020204" pitchFamily="34" charset="0"/>
-              <a:buChar char="•"/>
-            </a:pPr>
-            <a:r>
-              <a:rPr lang="es-EC" sz="3200" dirty="0"/>
-              <a:t>Se ha creado un diagrama para cada escenario</a:t>
+            <a:pPr marL="0" indent="0">
+              <a:lnSpc>
+                <a:spcPct val="150000"/>
+              </a:lnSpc>
+              <a:buNone/>
+            </a:pPr>
+            <a:r>
+              <a:rPr lang="es-ES" sz="3200" dirty="0"/>
+              <a:t>4.1.- Se puede salir del juego correctamente.</a:t>
+            </a:r>
+          </a:p>
+          <a:p>
+            <a:pPr marL="0" indent="0">
+              <a:lnSpc>
+                <a:spcPct val="150000"/>
+              </a:lnSpc>
+              <a:buNone/>
+            </a:pPr>
+            <a:endParaRPr lang="es-ES" sz="3200" dirty="0"/>
+          </a:p>
+          <a:p>
+            <a:pPr marL="0" indent="0">
+              <a:lnSpc>
+                <a:spcPct val="150000"/>
+              </a:lnSpc>
+              <a:buNone/>
+            </a:pPr>
+            <a:r>
+              <a:rPr lang="es-ES" sz="3200" dirty="0"/>
+              <a:t>4.2.- La salida del juego es incorrecta.</a:t>
             </a:r>
           </a:p>
         </p:txBody>
@@ -5884,7 +6149,7 @@
     </p:spTree>
     <p:extLst>
       <p:ext uri="{BB962C8B-B14F-4D97-AF65-F5344CB8AC3E}">
-        <p14:creationId xmlns:p14="http://schemas.microsoft.com/office/powerpoint/2010/main" val="605101303"/>
+        <p14:creationId xmlns:p14="http://schemas.microsoft.com/office/powerpoint/2010/main" val="1593641814"/>
       </p:ext>
     </p:extLst>
   </p:cSld>
@@ -5913,19 +6178,97 @@
       </p:grpSpPr>
       <p:sp>
         <p:nvSpPr>
-          <p:cNvPr id="2" name="CuadroTexto 1"/>
-          <p:cNvSpPr txBox="1"/>
+          <p:cNvPr id="6" name="AutoShape 4" descr="https://photos-2.dropbox.com/t/2/AADVKbXZN_BciGcZftNUb6FTCbTR0F5rtBOZquhn6VJB_g/12/208866478/png/32x32/1/_/1/2/Untitled%20Diagram.png/EK_4ws4EGAsgAigC/RqucL2BHwlWOXKxluo8r4SJrXLv0mWa8YzM8kTLzT88?size=800x600&amp;size_mode=3"/>
+          <p:cNvSpPr>
+            <a:spLocks noChangeAspect="1" noChangeArrowheads="1"/>
+          </p:cNvSpPr>
           <p:nvPr/>
         </p:nvSpPr>
-        <p:spPr>
-          <a:xfrm>
-            <a:off x="1798803" y="788204"/>
-            <a:ext cx="8607669" cy="4939814"/>
+        <p:spPr bwMode="auto">
+          <a:xfrm>
+            <a:off x="307975" y="7937"/>
+            <a:ext cx="304800" cy="304801"/>
           </a:xfrm>
           <a:prstGeom prst="rect">
             <a:avLst/>
           </a:prstGeom>
           <a:noFill/>
+          <a:extLst>
+            <a:ext uri="{909E8E84-426E-40DD-AFC4-6F175D3DCCD1}">
+              <a14:hiddenFill xmlns:a14="http://schemas.microsoft.com/office/drawing/2010/main">
+                <a:solidFill>
+                  <a:srgbClr val="FFFFFF"/>
+                </a:solidFill>
+              </a14:hiddenFill>
+            </a:ext>
+          </a:extLst>
+        </p:spPr>
+        <p:txBody>
+          <a:bodyPr vert="horz" wrap="square" lIns="91440" tIns="45720" rIns="91440" bIns="45720" numCol="1" anchor="t" anchorCtr="0" compatLnSpc="1">
+            <a:prstTxWarp prst="textNoShape">
+              <a:avLst/>
+            </a:prstTxWarp>
+          </a:bodyPr>
+          <a:lstStyle/>
+          <a:p>
+            <a:endParaRPr lang="es-ES"/>
+          </a:p>
+        </p:txBody>
+      </p:sp>
+      <p:sp>
+        <p:nvSpPr>
+          <p:cNvPr id="7" name="AutoShape 6" descr="https://photos-2.dropbox.com/t/2/AADVKbXZN_BciGcZftNUb6FTCbTR0F5rtBOZquhn6VJB_g/12/208866478/png/32x32/1/_/1/2/Untitled%20Diagram.png/EK_4ws4EGAsgAigC/RqucL2BHwlWOXKxluo8r4SJrXLv0mWa8YzM8kTLzT88?size=800x600&amp;size_mode=3"/>
+          <p:cNvSpPr>
+            <a:spLocks noChangeAspect="1" noChangeArrowheads="1"/>
+          </p:cNvSpPr>
+          <p:nvPr/>
+        </p:nvSpPr>
+        <p:spPr bwMode="auto">
+          <a:xfrm>
+            <a:off x="155575" y="-144463"/>
+            <a:ext cx="5590598" cy="5590616"/>
+          </a:xfrm>
+          <a:prstGeom prst="rect">
+            <a:avLst/>
+          </a:prstGeom>
+          <a:noFill/>
+          <a:extLst>
+            <a:ext uri="{909E8E84-426E-40DD-AFC4-6F175D3DCCD1}">
+              <a14:hiddenFill xmlns:a14="http://schemas.microsoft.com/office/drawing/2010/main">
+                <a:solidFill>
+                  <a:srgbClr val="FFFFFF"/>
+                </a:solidFill>
+              </a14:hiddenFill>
+            </a:ext>
+          </a:extLst>
+        </p:spPr>
+        <p:txBody>
+          <a:bodyPr vert="horz" wrap="square" lIns="91440" tIns="45720" rIns="91440" bIns="45720" numCol="1" anchor="t" anchorCtr="0" compatLnSpc="1">
+            <a:prstTxWarp prst="textNoShape">
+              <a:avLst/>
+            </a:prstTxWarp>
+          </a:bodyPr>
+          <a:lstStyle/>
+          <a:p>
+            <a:endParaRPr lang="es-ES"/>
+          </a:p>
+        </p:txBody>
+      </p:sp>
+      <p:sp>
+        <p:nvSpPr>
+          <p:cNvPr id="8" name="CuadroTexto 7"/>
+          <p:cNvSpPr txBox="1"/>
+          <p:nvPr/>
+        </p:nvSpPr>
+        <p:spPr>
+          <a:xfrm>
+            <a:off x="2311977" y="87600"/>
+            <a:ext cx="6868391" cy="769441"/>
+          </a:xfrm>
+          <a:prstGeom prst="rect">
+            <a:avLst/>
+          </a:prstGeom>
+          <a:noFill/>
         </p:spPr>
         <p:txBody>
           <a:bodyPr wrap="square" rtlCol="0">
@@ -5935,22 +6278,105 @@
           <a:p>
             <a:pPr algn="ctr"/>
             <a:r>
-              <a:rPr lang="es-EC" sz="10500" dirty="0"/>
-              <a:t>DIAGRAMA</a:t>
-            </a:r>
-          </a:p>
-          <a:p>
-            <a:pPr algn="ctr"/>
-            <a:r>
-              <a:rPr lang="es-EC" sz="10500" dirty="0"/>
-              <a:t> DE </a:t>
-            </a:r>
-          </a:p>
-          <a:p>
-            <a:pPr algn="ctr"/>
-            <a:r>
-              <a:rPr lang="es-EC" sz="10500" dirty="0"/>
-              <a:t>CLASES</a:t>
+              <a:rPr lang="es-ES" sz="4400" b="1" dirty="0"/>
+              <a:t>Especificación de Escenarios</a:t>
+            </a:r>
+            <a:endParaRPr lang="es-ES" sz="5400" dirty="0"/>
+          </a:p>
+        </p:txBody>
+      </p:sp>
+      <p:sp>
+        <p:nvSpPr>
+          <p:cNvPr id="9" name="CuadroTexto 8"/>
+          <p:cNvSpPr txBox="1"/>
+          <p:nvPr/>
+        </p:nvSpPr>
+        <p:spPr>
+          <a:xfrm>
+            <a:off x="1129769" y="1089104"/>
+            <a:ext cx="8743806" cy="4524315"/>
+          </a:xfrm>
+          <a:prstGeom prst="rect">
+            <a:avLst/>
+          </a:prstGeom>
+          <a:noFill/>
+        </p:spPr>
+        <p:txBody>
+          <a:bodyPr wrap="square" rtlCol="0">
+            <a:spAutoFit/>
+          </a:bodyPr>
+          <a:lstStyle/>
+          <a:p>
+            <a:pPr algn="just"/>
+            <a:r>
+              <a:rPr lang="es-ES" sz="3600" b="1" u="sng" dirty="0"/>
+              <a:t>Caso de Uso 4: </a:t>
+            </a:r>
+            <a:r>
+              <a:rPr lang="es-ES" sz="3600" dirty="0"/>
+              <a:t>Salir del juego</a:t>
+            </a:r>
+          </a:p>
+          <a:p>
+            <a:r>
+              <a:rPr lang="es-ES" sz="3600" b="1" u="sng" dirty="0"/>
+              <a:t>Escenario4.2: </a:t>
+            </a:r>
+            <a:r>
+              <a:rPr lang="es-ES" sz="3600" dirty="0"/>
+              <a:t>Se puede salir del juego correctamente.</a:t>
+            </a:r>
+          </a:p>
+          <a:p>
+            <a:pPr algn="just"/>
+            <a:r>
+              <a:rPr lang="es-ES" sz="3600" b="1" u="sng" dirty="0"/>
+              <a:t>Asunciones: </a:t>
+            </a:r>
+          </a:p>
+          <a:p>
+            <a:pPr marL="914400" lvl="1" indent="-457200" algn="just">
+              <a:buFont typeface="Arial" panose="020B0604020202020204" pitchFamily="34" charset="0"/>
+              <a:buChar char="•"/>
+            </a:pPr>
+            <a:r>
+              <a:rPr lang="es-ES" sz="3600" dirty="0"/>
+              <a:t>El jugador decide salir de </a:t>
+            </a:r>
+            <a:r>
+              <a:rPr lang="es-ES" sz="3600" dirty="0" err="1"/>
+              <a:t>TyperShark</a:t>
+            </a:r>
+            <a:r>
+              <a:rPr lang="es-ES" sz="3600" dirty="0"/>
+              <a:t>.</a:t>
+            </a:r>
+          </a:p>
+          <a:p>
+            <a:pPr marL="914400" lvl="1" indent="-457200" algn="just">
+              <a:buFont typeface="Arial" panose="020B0604020202020204" pitchFamily="34" charset="0"/>
+              <a:buChar char="•"/>
+            </a:pPr>
+            <a:r>
+              <a:rPr lang="es-ES" sz="3600" dirty="0"/>
+              <a:t>El jugador hizo clic en el botón Salir.</a:t>
+            </a:r>
+          </a:p>
+          <a:p>
+            <a:pPr algn="just"/>
+            <a:r>
+              <a:rPr lang="es-ES" sz="3600" b="1" u="sng" dirty="0"/>
+              <a:t>Resultados:</a:t>
+            </a:r>
+          </a:p>
+          <a:p>
+            <a:pPr marL="914400" lvl="1" indent="-457200" algn="just">
+              <a:buFont typeface="Arial" panose="020B0604020202020204" pitchFamily="34" charset="0"/>
+              <a:buChar char="•"/>
+            </a:pPr>
+            <a:r>
+              <a:rPr lang="es-ES" sz="3600" dirty="0"/>
+              <a:t>Se cierra la ventana principal del juego.</a:t>
             </a:r>
           </a:p>
         </p:txBody>
@@ -5958,7 +6384,7 @@
     </p:spTree>
     <p:extLst>
       <p:ext uri="{BB962C8B-B14F-4D97-AF65-F5344CB8AC3E}">
-        <p14:creationId xmlns:p14="http://schemas.microsoft.com/office/powerpoint/2010/main" val="4137507620"/>
+        <p14:creationId xmlns:p14="http://schemas.microsoft.com/office/powerpoint/2010/main" val="2246678701"/>
       </p:ext>
     </p:extLst>
   </p:cSld>
@@ -5987,19 +6413,97 @@
       </p:grpSpPr>
       <p:sp>
         <p:nvSpPr>
-          <p:cNvPr id="2" name="CuadroTexto 1"/>
-          <p:cNvSpPr txBox="1"/>
+          <p:cNvPr id="6" name="AutoShape 4" descr="https://photos-2.dropbox.com/t/2/AADVKbXZN_BciGcZftNUb6FTCbTR0F5rtBOZquhn6VJB_g/12/208866478/png/32x32/1/_/1/2/Untitled%20Diagram.png/EK_4ws4EGAsgAigC/RqucL2BHwlWOXKxluo8r4SJrXLv0mWa8YzM8kTLzT88?size=800x600&amp;size_mode=3"/>
+          <p:cNvSpPr>
+            <a:spLocks noChangeAspect="1" noChangeArrowheads="1"/>
+          </p:cNvSpPr>
           <p:nvPr/>
         </p:nvSpPr>
-        <p:spPr>
-          <a:xfrm>
-            <a:off x="1758462" y="1406769"/>
-            <a:ext cx="8607669" cy="3816429"/>
+        <p:spPr bwMode="auto">
+          <a:xfrm>
+            <a:off x="307975" y="7937"/>
+            <a:ext cx="304800" cy="304801"/>
           </a:xfrm>
           <a:prstGeom prst="rect">
             <a:avLst/>
           </a:prstGeom>
           <a:noFill/>
+          <a:extLst>
+            <a:ext uri="{909E8E84-426E-40DD-AFC4-6F175D3DCCD1}">
+              <a14:hiddenFill xmlns:a14="http://schemas.microsoft.com/office/drawing/2010/main">
+                <a:solidFill>
+                  <a:srgbClr val="FFFFFF"/>
+                </a:solidFill>
+              </a14:hiddenFill>
+            </a:ext>
+          </a:extLst>
+        </p:spPr>
+        <p:txBody>
+          <a:bodyPr vert="horz" wrap="square" lIns="91440" tIns="45720" rIns="91440" bIns="45720" numCol="1" anchor="t" anchorCtr="0" compatLnSpc="1">
+            <a:prstTxWarp prst="textNoShape">
+              <a:avLst/>
+            </a:prstTxWarp>
+          </a:bodyPr>
+          <a:lstStyle/>
+          <a:p>
+            <a:endParaRPr lang="es-ES"/>
+          </a:p>
+        </p:txBody>
+      </p:sp>
+      <p:sp>
+        <p:nvSpPr>
+          <p:cNvPr id="7" name="AutoShape 6" descr="https://photos-2.dropbox.com/t/2/AADVKbXZN_BciGcZftNUb6FTCbTR0F5rtBOZquhn6VJB_g/12/208866478/png/32x32/1/_/1/2/Untitled%20Diagram.png/EK_4ws4EGAsgAigC/RqucL2BHwlWOXKxluo8r4SJrXLv0mWa8YzM8kTLzT88?size=800x600&amp;size_mode=3"/>
+          <p:cNvSpPr>
+            <a:spLocks noChangeAspect="1" noChangeArrowheads="1"/>
+          </p:cNvSpPr>
+          <p:nvPr/>
+        </p:nvSpPr>
+        <p:spPr bwMode="auto">
+          <a:xfrm>
+            <a:off x="155575" y="-144463"/>
+            <a:ext cx="5590598" cy="5590616"/>
+          </a:xfrm>
+          <a:prstGeom prst="rect">
+            <a:avLst/>
+          </a:prstGeom>
+          <a:noFill/>
+          <a:extLst>
+            <a:ext uri="{909E8E84-426E-40DD-AFC4-6F175D3DCCD1}">
+              <a14:hiddenFill xmlns:a14="http://schemas.microsoft.com/office/drawing/2010/main">
+                <a:solidFill>
+                  <a:srgbClr val="FFFFFF"/>
+                </a:solidFill>
+              </a14:hiddenFill>
+            </a:ext>
+          </a:extLst>
+        </p:spPr>
+        <p:txBody>
+          <a:bodyPr vert="horz" wrap="square" lIns="91440" tIns="45720" rIns="91440" bIns="45720" numCol="1" anchor="t" anchorCtr="0" compatLnSpc="1">
+            <a:prstTxWarp prst="textNoShape">
+              <a:avLst/>
+            </a:prstTxWarp>
+          </a:bodyPr>
+          <a:lstStyle/>
+          <a:p>
+            <a:endParaRPr lang="es-ES"/>
+          </a:p>
+        </p:txBody>
+      </p:sp>
+      <p:sp>
+        <p:nvSpPr>
+          <p:cNvPr id="8" name="CuadroTexto 7"/>
+          <p:cNvSpPr txBox="1"/>
+          <p:nvPr/>
+        </p:nvSpPr>
+        <p:spPr>
+          <a:xfrm>
+            <a:off x="2311977" y="87600"/>
+            <a:ext cx="6868391" cy="769441"/>
+          </a:xfrm>
+          <a:prstGeom prst="rect">
+            <a:avLst/>
+          </a:prstGeom>
+          <a:noFill/>
         </p:spPr>
         <p:txBody>
           <a:bodyPr wrap="square" rtlCol="0">
@@ -6009,8 +6513,301 @@
           <a:p>
             <a:pPr algn="ctr"/>
             <a:r>
+              <a:rPr lang="es-ES" sz="4400" b="1" dirty="0"/>
+              <a:t>Especificación de Escenarios</a:t>
+            </a:r>
+            <a:endParaRPr lang="es-ES" sz="5400" dirty="0"/>
+          </a:p>
+        </p:txBody>
+      </p:sp>
+      <p:sp>
+        <p:nvSpPr>
+          <p:cNvPr id="2" name="Rectángulo 1"/>
+          <p:cNvSpPr/>
+          <p:nvPr/>
+        </p:nvSpPr>
+        <p:spPr>
+          <a:xfrm>
+            <a:off x="992221" y="954236"/>
+            <a:ext cx="9426101" cy="5632311"/>
+          </a:xfrm>
+          <a:prstGeom prst="rect">
+            <a:avLst/>
+          </a:prstGeom>
+        </p:spPr>
+        <p:txBody>
+          <a:bodyPr wrap="square">
+            <a:spAutoFit/>
+          </a:bodyPr>
+          <a:lstStyle/>
+          <a:p>
+            <a:pPr algn="just"/>
+            <a:r>
+              <a:rPr lang="es-ES" sz="3600" b="1" u="sng" dirty="0"/>
+              <a:t>Caso de Uso 4: </a:t>
+            </a:r>
+            <a:r>
+              <a:rPr lang="es-ES" sz="3600" dirty="0"/>
+              <a:t>Salir del juego</a:t>
+            </a:r>
+          </a:p>
+          <a:p>
+            <a:r>
+              <a:rPr lang="es-ES" sz="3600" b="1" u="sng" dirty="0"/>
+              <a:t>Escenario4.2: </a:t>
+            </a:r>
+            <a:r>
+              <a:rPr lang="es-ES" sz="3600" dirty="0"/>
+              <a:t>La salida del juego es incorrecta.</a:t>
+            </a:r>
+          </a:p>
+          <a:p>
+            <a:pPr algn="just"/>
+            <a:r>
+              <a:rPr lang="es-ES" sz="3600" b="1" u="sng" dirty="0"/>
+              <a:t>Asunciones:</a:t>
+            </a:r>
+            <a:endParaRPr lang="es-ES" sz="3600" dirty="0"/>
+          </a:p>
+          <a:p>
+            <a:pPr marL="914400" lvl="1" indent="-457200" algn="just">
+              <a:buFont typeface="Arial" panose="020B0604020202020204" pitchFamily="34" charset="0"/>
+              <a:buChar char="•"/>
+            </a:pPr>
+            <a:r>
+              <a:rPr lang="es-ES" sz="3600" dirty="0"/>
+              <a:t>El jugador hizo clic en otro botón.</a:t>
+            </a:r>
+          </a:p>
+          <a:p>
+            <a:pPr marL="914400" lvl="1" indent="-457200" algn="just">
+              <a:buFont typeface="Arial" panose="020B0604020202020204" pitchFamily="34" charset="0"/>
+              <a:buChar char="•"/>
+            </a:pPr>
+            <a:r>
+              <a:rPr lang="es-ES" sz="3600" dirty="0"/>
+              <a:t>Que se haya quedado un hilo activado.</a:t>
+            </a:r>
+          </a:p>
+          <a:p>
+            <a:pPr algn="just"/>
+            <a:r>
+              <a:rPr lang="es-ES" sz="3600" b="1" u="sng" dirty="0"/>
+              <a:t>Resultados:</a:t>
+            </a:r>
+          </a:p>
+          <a:p>
+            <a:pPr marL="914400" lvl="1" indent="-457200" algn="just">
+              <a:buFont typeface="Arial" panose="020B0604020202020204" pitchFamily="34" charset="0"/>
+              <a:buChar char="•"/>
+            </a:pPr>
+            <a:r>
+              <a:rPr lang="es-ES" sz="3600" dirty="0"/>
+              <a:t>No se puede salir del juego ya que el botón Salir no fue presionado.</a:t>
+            </a:r>
+          </a:p>
+          <a:p>
+            <a:pPr marL="914400" lvl="1" indent="-457200" algn="just">
+              <a:buFont typeface="Arial" panose="020B0604020202020204" pitchFamily="34" charset="0"/>
+              <a:buChar char="•"/>
+            </a:pPr>
+            <a:r>
+              <a:rPr lang="es-ES" sz="3600" dirty="0"/>
+              <a:t>Puede generar un error de compilación o una excepción.</a:t>
+            </a:r>
+          </a:p>
+        </p:txBody>
+      </p:sp>
+    </p:spTree>
+    <p:extLst>
+      <p:ext uri="{BB962C8B-B14F-4D97-AF65-F5344CB8AC3E}">
+        <p14:creationId xmlns:p14="http://schemas.microsoft.com/office/powerpoint/2010/main" val="1413300860"/>
+      </p:ext>
+    </p:extLst>
+  </p:cSld>
+  <p:clrMapOvr>
+    <a:masterClrMapping/>
+  </p:clrMapOvr>
+</p:sld>
+</file>
+
+<file path=ppt/slides/slide24.xml><?xml version="1.0" encoding="utf-8"?>
+<p:sld xmlns:a="http://schemas.openxmlformats.org/drawingml/2006/main" xmlns:r="http://schemas.openxmlformats.org/officeDocument/2006/relationships" xmlns:p="http://schemas.openxmlformats.org/presentationml/2006/main">
+  <p:cSld>
+    <p:spTree>
+      <p:nvGrpSpPr>
+        <p:cNvPr id="1" name=""/>
+        <p:cNvGrpSpPr/>
+        <p:nvPr/>
+      </p:nvGrpSpPr>
+      <p:grpSpPr>
+        <a:xfrm>
+          <a:off x="0" y="0"/>
+          <a:ext cx="0" cy="0"/>
+          <a:chOff x="0" y="0"/>
+          <a:chExt cx="0" cy="0"/>
+        </a:xfrm>
+      </p:grpSpPr>
+      <p:sp>
+        <p:nvSpPr>
+          <p:cNvPr id="2" name="CuadroTexto 1"/>
+          <p:cNvSpPr txBox="1"/>
+          <p:nvPr/>
+        </p:nvSpPr>
+        <p:spPr>
+          <a:xfrm>
+            <a:off x="1798803" y="788204"/>
+            <a:ext cx="8607669" cy="4939814"/>
+          </a:xfrm>
+          <a:prstGeom prst="rect">
+            <a:avLst/>
+          </a:prstGeom>
+          <a:noFill/>
+        </p:spPr>
+        <p:txBody>
+          <a:bodyPr wrap="square" rtlCol="0">
+            <a:spAutoFit/>
+          </a:bodyPr>
+          <a:lstStyle/>
+          <a:p>
+            <a:pPr algn="ctr"/>
+            <a:r>
+              <a:rPr lang="es-EC" sz="10500" dirty="0"/>
+              <a:t>DIAGRAMA</a:t>
+            </a:r>
+          </a:p>
+          <a:p>
+            <a:pPr algn="ctr"/>
+            <a:r>
+              <a:rPr lang="es-EC" sz="10500" dirty="0"/>
+              <a:t> DE </a:t>
+            </a:r>
+          </a:p>
+          <a:p>
+            <a:pPr algn="ctr"/>
+            <a:r>
+              <a:rPr lang="es-EC" sz="10500" dirty="0"/>
+              <a:t>CLASES</a:t>
+            </a:r>
+          </a:p>
+        </p:txBody>
+      </p:sp>
+    </p:spTree>
+    <p:extLst>
+      <p:ext uri="{BB962C8B-B14F-4D97-AF65-F5344CB8AC3E}">
+        <p14:creationId xmlns:p14="http://schemas.microsoft.com/office/powerpoint/2010/main" val="4137507620"/>
+      </p:ext>
+    </p:extLst>
+  </p:cSld>
+  <p:clrMapOvr>
+    <a:masterClrMapping/>
+  </p:clrMapOvr>
+</p:sld>
+</file>
+
+<file path=ppt/slides/slide25.xml><?xml version="1.0" encoding="utf-8"?>
+<p:sld xmlns:a="http://schemas.openxmlformats.org/drawingml/2006/main" xmlns:r="http://schemas.openxmlformats.org/officeDocument/2006/relationships" xmlns:p="http://schemas.openxmlformats.org/presentationml/2006/main">
+  <p:cSld>
+    <p:spTree>
+      <p:nvGrpSpPr>
+        <p:cNvPr id="1" name=""/>
+        <p:cNvGrpSpPr/>
+        <p:nvPr/>
+      </p:nvGrpSpPr>
+      <p:grpSpPr>
+        <a:xfrm>
+          <a:off x="0" y="0"/>
+          <a:ext cx="0" cy="0"/>
+          <a:chOff x="0" y="0"/>
+          <a:chExt cx="0" cy="0"/>
+        </a:xfrm>
+      </p:grpSpPr>
+      <p:pic>
+        <p:nvPicPr>
+          <p:cNvPr id="3" name="Imagen 2"/>
+          <p:cNvPicPr>
+            <a:picLocks noChangeAspect="1"/>
+          </p:cNvPicPr>
+          <p:nvPr/>
+        </p:nvPicPr>
+        <p:blipFill>
+          <a:blip r:embed="rId2">
+            <a:extLst>
+              <a:ext uri="{28A0092B-C50C-407E-A947-70E740481C1C}">
+                <a14:useLocalDpi xmlns:a14="http://schemas.microsoft.com/office/drawing/2010/main" val="0"/>
+              </a:ext>
+            </a:extLst>
+          </a:blip>
+          <a:stretch>
+            <a:fillRect/>
+          </a:stretch>
+        </p:blipFill>
+        <p:spPr>
+          <a:xfrm>
+            <a:off x="1585449" y="0"/>
+            <a:ext cx="9215327" cy="6858000"/>
+          </a:xfrm>
+          <a:prstGeom prst="rect">
+            <a:avLst/>
+          </a:prstGeom>
+        </p:spPr>
+      </p:pic>
+    </p:spTree>
+    <p:extLst>
+      <p:ext uri="{BB962C8B-B14F-4D97-AF65-F5344CB8AC3E}">
+        <p14:creationId xmlns:p14="http://schemas.microsoft.com/office/powerpoint/2010/main" val="3813361983"/>
+      </p:ext>
+    </p:extLst>
+  </p:cSld>
+  <p:clrMapOvr>
+    <a:masterClrMapping/>
+  </p:clrMapOvr>
+</p:sld>
+</file>
+
+<file path=ppt/slides/slide26.xml><?xml version="1.0" encoding="utf-8"?>
+<p:sld xmlns:a="http://schemas.openxmlformats.org/drawingml/2006/main" xmlns:r="http://schemas.openxmlformats.org/officeDocument/2006/relationships" xmlns:p="http://schemas.openxmlformats.org/presentationml/2006/main">
+  <p:cSld>
+    <p:spTree>
+      <p:nvGrpSpPr>
+        <p:cNvPr id="1" name=""/>
+        <p:cNvGrpSpPr/>
+        <p:nvPr/>
+      </p:nvGrpSpPr>
+      <p:grpSpPr>
+        <a:xfrm>
+          <a:off x="0" y="0"/>
+          <a:ext cx="0" cy="0"/>
+          <a:chOff x="0" y="0"/>
+          <a:chExt cx="0" cy="0"/>
+        </a:xfrm>
+      </p:grpSpPr>
+      <p:sp>
+        <p:nvSpPr>
+          <p:cNvPr id="2" name="CuadroTexto 1"/>
+          <p:cNvSpPr txBox="1"/>
+          <p:nvPr/>
+        </p:nvSpPr>
+        <p:spPr>
+          <a:xfrm>
+            <a:off x="1758462" y="1406769"/>
+            <a:ext cx="8607669" cy="3816429"/>
+          </a:xfrm>
+          <a:prstGeom prst="rect">
+            <a:avLst/>
+          </a:prstGeom>
+          <a:noFill/>
+        </p:spPr>
+        <p:txBody>
+          <a:bodyPr wrap="square" rtlCol="0">
+            <a:spAutoFit/>
+          </a:bodyPr>
+          <a:lstStyle/>
+          <a:p>
+            <a:pPr algn="ctr"/>
+            <a:r>
               <a:rPr lang="es-EC" sz="9600" dirty="0"/>
-              <a:t>DIAGRAMAS DE COLABORACIÓN</a:t>
+              <a:t>DIAGRAMAS DE SECUENCIA</a:t>
             </a:r>
           </a:p>
           <a:p>
@@ -6023,7 +6820,7 @@
             </a:pPr>
             <a:r>
               <a:rPr lang="es-EC" sz="3200" dirty="0"/>
-              <a:t>Se ha creado un diagrama para cada escenario</a:t>
+              <a:t>Se ha creado un diagrama para cada escenario.</a:t>
             </a:r>
           </a:p>
         </p:txBody>
@@ -6031,7 +6828,274 @@
     </p:spTree>
     <p:extLst>
       <p:ext uri="{BB962C8B-B14F-4D97-AF65-F5344CB8AC3E}">
-        <p14:creationId xmlns:p14="http://schemas.microsoft.com/office/powerpoint/2010/main" val="2137973027"/>
+        <p14:creationId xmlns:p14="http://schemas.microsoft.com/office/powerpoint/2010/main" val="605101303"/>
+      </p:ext>
+    </p:extLst>
+  </p:cSld>
+  <p:clrMapOvr>
+    <a:masterClrMapping/>
+  </p:clrMapOvr>
+</p:sld>
+</file>
+
+<file path=ppt/slides/slide27.xml><?xml version="1.0" encoding="utf-8"?>
+<p:sld xmlns:a="http://schemas.openxmlformats.org/drawingml/2006/main" xmlns:r="http://schemas.openxmlformats.org/officeDocument/2006/relationships" xmlns:p="http://schemas.openxmlformats.org/presentationml/2006/main">
+  <p:cSld>
+    <p:spTree>
+      <p:nvGrpSpPr>
+        <p:cNvPr id="1" name=""/>
+        <p:cNvGrpSpPr/>
+        <p:nvPr/>
+      </p:nvGrpSpPr>
+      <p:grpSpPr>
+        <a:xfrm>
+          <a:off x="0" y="0"/>
+          <a:ext cx="0" cy="0"/>
+          <a:chOff x="0" y="0"/>
+          <a:chExt cx="0" cy="0"/>
+        </a:xfrm>
+      </p:grpSpPr>
+      <p:pic>
+        <p:nvPicPr>
+          <p:cNvPr id="5" name="Imagen 4"/>
+          <p:cNvPicPr>
+            <a:picLocks noChangeAspect="1"/>
+          </p:cNvPicPr>
+          <p:nvPr/>
+        </p:nvPicPr>
+        <p:blipFill>
+          <a:blip r:embed="rId2">
+            <a:extLst>
+              <a:ext uri="{28A0092B-C50C-407E-A947-70E740481C1C}">
+                <a14:useLocalDpi xmlns:a14="http://schemas.microsoft.com/office/drawing/2010/main" val="0"/>
+              </a:ext>
+            </a:extLst>
+          </a:blip>
+          <a:stretch>
+            <a:fillRect/>
+          </a:stretch>
+        </p:blipFill>
+        <p:spPr>
+          <a:xfrm>
+            <a:off x="1913647" y="0"/>
+            <a:ext cx="9756183" cy="6858000"/>
+          </a:xfrm>
+          <a:prstGeom prst="rect">
+            <a:avLst/>
+          </a:prstGeom>
+        </p:spPr>
+      </p:pic>
+      <p:sp>
+        <p:nvSpPr>
+          <p:cNvPr id="6" name="CuadroTexto 5"/>
+          <p:cNvSpPr txBox="1"/>
+          <p:nvPr/>
+        </p:nvSpPr>
+        <p:spPr>
+          <a:xfrm>
+            <a:off x="589083" y="131886"/>
+            <a:ext cx="549894" cy="6858000"/>
+          </a:xfrm>
+          <a:prstGeom prst="rect">
+            <a:avLst/>
+          </a:prstGeom>
+          <a:noFill/>
+        </p:spPr>
+        <p:txBody>
+          <a:bodyPr vert="wordArtVert" wrap="square" rtlCol="0">
+            <a:spAutoFit/>
+          </a:bodyPr>
+          <a:lstStyle/>
+          <a:p>
+            <a:r>
+              <a:rPr lang="es-EC" sz="2000" b="1" u="sng" dirty="0"/>
+              <a:t>ESCENARIO 1.1.1.</a:t>
+            </a:r>
+          </a:p>
+        </p:txBody>
+      </p:sp>
+    </p:spTree>
+    <p:extLst>
+      <p:ext uri="{BB962C8B-B14F-4D97-AF65-F5344CB8AC3E}">
+        <p14:creationId xmlns:p14="http://schemas.microsoft.com/office/powerpoint/2010/main" val="2263636442"/>
+      </p:ext>
+    </p:extLst>
+  </p:cSld>
+  <p:clrMapOvr>
+    <a:masterClrMapping/>
+  </p:clrMapOvr>
+</p:sld>
+</file>
+
+<file path=ppt/slides/slide28.xml><?xml version="1.0" encoding="utf-8"?>
+<p:sld xmlns:a="http://schemas.openxmlformats.org/drawingml/2006/main" xmlns:r="http://schemas.openxmlformats.org/officeDocument/2006/relationships" xmlns:p="http://schemas.openxmlformats.org/presentationml/2006/main">
+  <p:cSld>
+    <p:spTree>
+      <p:nvGrpSpPr>
+        <p:cNvPr id="1" name=""/>
+        <p:cNvGrpSpPr/>
+        <p:nvPr/>
+      </p:nvGrpSpPr>
+      <p:grpSpPr>
+        <a:xfrm>
+          <a:off x="0" y="0"/>
+          <a:ext cx="0" cy="0"/>
+          <a:chOff x="0" y="0"/>
+          <a:chExt cx="0" cy="0"/>
+        </a:xfrm>
+      </p:grpSpPr>
+      <p:sp>
+        <p:nvSpPr>
+          <p:cNvPr id="2" name="CuadroTexto 1"/>
+          <p:cNvSpPr txBox="1"/>
+          <p:nvPr/>
+        </p:nvSpPr>
+        <p:spPr>
+          <a:xfrm>
+            <a:off x="589083" y="131886"/>
+            <a:ext cx="549894" cy="6858000"/>
+          </a:xfrm>
+          <a:prstGeom prst="rect">
+            <a:avLst/>
+          </a:prstGeom>
+          <a:noFill/>
+        </p:spPr>
+        <p:txBody>
+          <a:bodyPr vert="wordArtVert" wrap="square" rtlCol="0">
+            <a:spAutoFit/>
+          </a:bodyPr>
+          <a:lstStyle/>
+          <a:p>
+            <a:r>
+              <a:rPr lang="es-EC" sz="2000" b="1" u="sng" dirty="0"/>
+              <a:t>ESCENARIO 1.1.2.</a:t>
+            </a:r>
+          </a:p>
+        </p:txBody>
+      </p:sp>
+      <p:pic>
+        <p:nvPicPr>
+          <p:cNvPr id="3" name="Imagen 2"/>
+          <p:cNvPicPr>
+            <a:picLocks noChangeAspect="1"/>
+          </p:cNvPicPr>
+          <p:nvPr/>
+        </p:nvPicPr>
+        <p:blipFill>
+          <a:blip r:embed="rId2">
+            <a:extLst>
+              <a:ext uri="{28A0092B-C50C-407E-A947-70E740481C1C}">
+                <a14:useLocalDpi xmlns:a14="http://schemas.microsoft.com/office/drawing/2010/main" val="0"/>
+              </a:ext>
+            </a:extLst>
+          </a:blip>
+          <a:stretch>
+            <a:fillRect/>
+          </a:stretch>
+        </p:blipFill>
+        <p:spPr>
+          <a:xfrm>
+            <a:off x="1841883" y="0"/>
+            <a:ext cx="9740685" cy="6858000"/>
+          </a:xfrm>
+          <a:prstGeom prst="rect">
+            <a:avLst/>
+          </a:prstGeom>
+        </p:spPr>
+      </p:pic>
+    </p:spTree>
+    <p:extLst>
+      <p:ext uri="{BB962C8B-B14F-4D97-AF65-F5344CB8AC3E}">
+        <p14:creationId xmlns:p14="http://schemas.microsoft.com/office/powerpoint/2010/main" val="3448991256"/>
+      </p:ext>
+    </p:extLst>
+  </p:cSld>
+  <p:clrMapOvr>
+    <a:masterClrMapping/>
+  </p:clrMapOvr>
+</p:sld>
+</file>
+
+<file path=ppt/slides/slide29.xml><?xml version="1.0" encoding="utf-8"?>
+<p:sld xmlns:a="http://schemas.openxmlformats.org/drawingml/2006/main" xmlns:r="http://schemas.openxmlformats.org/officeDocument/2006/relationships" xmlns:p="http://schemas.openxmlformats.org/presentationml/2006/main">
+  <p:cSld>
+    <p:spTree>
+      <p:nvGrpSpPr>
+        <p:cNvPr id="1" name=""/>
+        <p:cNvGrpSpPr/>
+        <p:nvPr/>
+      </p:nvGrpSpPr>
+      <p:grpSpPr>
+        <a:xfrm>
+          <a:off x="0" y="0"/>
+          <a:ext cx="0" cy="0"/>
+          <a:chOff x="0" y="0"/>
+          <a:chExt cx="0" cy="0"/>
+        </a:xfrm>
+      </p:grpSpPr>
+      <p:sp>
+        <p:nvSpPr>
+          <p:cNvPr id="2" name="CuadroTexto 1"/>
+          <p:cNvSpPr txBox="1"/>
+          <p:nvPr/>
+        </p:nvSpPr>
+        <p:spPr>
+          <a:xfrm>
+            <a:off x="589083" y="131886"/>
+            <a:ext cx="549894" cy="6858000"/>
+          </a:xfrm>
+          <a:prstGeom prst="rect">
+            <a:avLst/>
+          </a:prstGeom>
+          <a:noFill/>
+        </p:spPr>
+        <p:txBody>
+          <a:bodyPr vert="wordArtVert" wrap="square" rtlCol="0">
+            <a:spAutoFit/>
+          </a:bodyPr>
+          <a:lstStyle/>
+          <a:p>
+            <a:r>
+              <a:rPr lang="es-EC" sz="2000" b="1" u="sng" dirty="0"/>
+              <a:t>ESCENARIO 1.1.3.</a:t>
+            </a:r>
+          </a:p>
+        </p:txBody>
+      </p:sp>
+      <p:pic>
+        <p:nvPicPr>
+          <p:cNvPr id="3" name="Imagen 2"/>
+          <p:cNvPicPr>
+            <a:picLocks noChangeAspect="1"/>
+          </p:cNvPicPr>
+          <p:nvPr/>
+        </p:nvPicPr>
+        <p:blipFill>
+          <a:blip r:embed="rId2">
+            <a:extLst>
+              <a:ext uri="{28A0092B-C50C-407E-A947-70E740481C1C}">
+                <a14:useLocalDpi xmlns:a14="http://schemas.microsoft.com/office/drawing/2010/main" val="0"/>
+              </a:ext>
+            </a:extLst>
+          </a:blip>
+          <a:stretch>
+            <a:fillRect/>
+          </a:stretch>
+        </p:blipFill>
+        <p:spPr>
+          <a:xfrm>
+            <a:off x="1649598" y="0"/>
+            <a:ext cx="9740685" cy="6858000"/>
+          </a:xfrm>
+          <a:prstGeom prst="rect">
+            <a:avLst/>
+          </a:prstGeom>
+        </p:spPr>
+      </p:pic>
+    </p:spTree>
+    <p:extLst>
+      <p:ext uri="{BB962C8B-B14F-4D97-AF65-F5344CB8AC3E}">
+        <p14:creationId xmlns:p14="http://schemas.microsoft.com/office/powerpoint/2010/main" val="197771130"/>
       </p:ext>
     </p:extLst>
   </p:cSld>
@@ -6245,6 +7309,152 @@
     <p:extLst>
       <p:ext uri="{BB962C8B-B14F-4D97-AF65-F5344CB8AC3E}">
         <p14:creationId xmlns:p14="http://schemas.microsoft.com/office/powerpoint/2010/main" val="3154544535"/>
+      </p:ext>
+    </p:extLst>
+  </p:cSld>
+  <p:clrMapOvr>
+    <a:masterClrMapping/>
+  </p:clrMapOvr>
+</p:sld>
+</file>
+
+<file path=ppt/slides/slide30.xml><?xml version="1.0" encoding="utf-8"?>
+<p:sld xmlns:a="http://schemas.openxmlformats.org/drawingml/2006/main" xmlns:r="http://schemas.openxmlformats.org/officeDocument/2006/relationships" xmlns:p="http://schemas.openxmlformats.org/presentationml/2006/main">
+  <p:cSld>
+    <p:spTree>
+      <p:nvGrpSpPr>
+        <p:cNvPr id="1" name=""/>
+        <p:cNvGrpSpPr/>
+        <p:nvPr/>
+      </p:nvGrpSpPr>
+      <p:grpSpPr>
+        <a:xfrm>
+          <a:off x="0" y="0"/>
+          <a:ext cx="0" cy="0"/>
+          <a:chOff x="0" y="0"/>
+          <a:chExt cx="0" cy="0"/>
+        </a:xfrm>
+      </p:grpSpPr>
+      <p:sp>
+        <p:nvSpPr>
+          <p:cNvPr id="2" name="CuadroTexto 1"/>
+          <p:cNvSpPr txBox="1"/>
+          <p:nvPr/>
+        </p:nvSpPr>
+        <p:spPr>
+          <a:xfrm>
+            <a:off x="1758462" y="1406769"/>
+            <a:ext cx="8607669" cy="3816429"/>
+          </a:xfrm>
+          <a:prstGeom prst="rect">
+            <a:avLst/>
+          </a:prstGeom>
+          <a:noFill/>
+        </p:spPr>
+        <p:txBody>
+          <a:bodyPr wrap="square" rtlCol="0">
+            <a:spAutoFit/>
+          </a:bodyPr>
+          <a:lstStyle/>
+          <a:p>
+            <a:pPr algn="ctr"/>
+            <a:r>
+              <a:rPr lang="es-EC" sz="9600" dirty="0"/>
+              <a:t>DIAGRAMAS DE COLABORACIÓN</a:t>
+            </a:r>
+          </a:p>
+          <a:p>
+            <a:endParaRPr lang="es-EC" dirty="0"/>
+          </a:p>
+          <a:p>
+            <a:pPr marL="457200" indent="-457200">
+              <a:buFont typeface="Arial" panose="020B0604020202020204" pitchFamily="34" charset="0"/>
+              <a:buChar char="•"/>
+            </a:pPr>
+            <a:r>
+              <a:rPr lang="es-EC" sz="3200" dirty="0"/>
+              <a:t>Se ha creado un diagrama para cada escenario.</a:t>
+            </a:r>
+          </a:p>
+        </p:txBody>
+      </p:sp>
+    </p:spTree>
+    <p:extLst>
+      <p:ext uri="{BB962C8B-B14F-4D97-AF65-F5344CB8AC3E}">
+        <p14:creationId xmlns:p14="http://schemas.microsoft.com/office/powerpoint/2010/main" val="2137973027"/>
+      </p:ext>
+    </p:extLst>
+  </p:cSld>
+  <p:clrMapOvr>
+    <a:masterClrMapping/>
+  </p:clrMapOvr>
+</p:sld>
+</file>
+
+<file path=ppt/slides/slide31.xml><?xml version="1.0" encoding="utf-8"?>
+<p:sld xmlns:a="http://schemas.openxmlformats.org/drawingml/2006/main" xmlns:r="http://schemas.openxmlformats.org/officeDocument/2006/relationships" xmlns:p="http://schemas.openxmlformats.org/presentationml/2006/main">
+  <p:cSld>
+    <p:spTree>
+      <p:nvGrpSpPr>
+        <p:cNvPr id="1" name=""/>
+        <p:cNvGrpSpPr/>
+        <p:nvPr/>
+      </p:nvGrpSpPr>
+      <p:grpSpPr>
+        <a:xfrm>
+          <a:off x="0" y="0"/>
+          <a:ext cx="0" cy="0"/>
+          <a:chOff x="0" y="0"/>
+          <a:chExt cx="0" cy="0"/>
+        </a:xfrm>
+      </p:grpSpPr>
+      <p:sp>
+        <p:nvSpPr>
+          <p:cNvPr id="2" name="CuadroTexto 1"/>
+          <p:cNvSpPr txBox="1"/>
+          <p:nvPr/>
+        </p:nvSpPr>
+        <p:spPr>
+          <a:xfrm>
+            <a:off x="1758462" y="1406769"/>
+            <a:ext cx="8607669" cy="2339102"/>
+          </a:xfrm>
+          <a:prstGeom prst="rect">
+            <a:avLst/>
+          </a:prstGeom>
+          <a:noFill/>
+        </p:spPr>
+        <p:txBody>
+          <a:bodyPr wrap="square" rtlCol="0">
+            <a:spAutoFit/>
+          </a:bodyPr>
+          <a:lstStyle/>
+          <a:p>
+            <a:pPr algn="ctr"/>
+            <a:r>
+              <a:rPr lang="es-EC" sz="9600" dirty="0"/>
+              <a:t>ANEXOS</a:t>
+            </a:r>
+          </a:p>
+          <a:p>
+            <a:endParaRPr lang="es-EC" dirty="0"/>
+          </a:p>
+          <a:p>
+            <a:pPr marL="457200" indent="-457200">
+              <a:buFont typeface="Arial" panose="020B0604020202020204" pitchFamily="34" charset="0"/>
+              <a:buChar char="•"/>
+            </a:pPr>
+            <a:r>
+              <a:rPr lang="es-EC" sz="3200" dirty="0"/>
+              <a:t>Avances de nuestro proyecto.</a:t>
+            </a:r>
+          </a:p>
+        </p:txBody>
+      </p:sp>
+    </p:spTree>
+    <p:extLst>
+      <p:ext uri="{BB962C8B-B14F-4D97-AF65-F5344CB8AC3E}">
+        <p14:creationId xmlns:p14="http://schemas.microsoft.com/office/powerpoint/2010/main" val="25171691"/>
       </p:ext>
     </p:extLst>
   </p:cSld>
@@ -7405,11 +8615,11 @@
         </p:spPr>
         <p:txBody>
           <a:bodyPr>
-            <a:normAutofit/>
+            <a:normAutofit fontScale="77500" lnSpcReduction="20000"/>
           </a:bodyPr>
           <a:lstStyle/>
           <a:p>
-            <a:pPr marL="0" indent="0">
+            <a:pPr marL="0" indent="0" algn="just">
               <a:lnSpc>
                 <a:spcPct val="150000"/>
               </a:lnSpc>
@@ -7421,16 +8631,56 @@
             </a:r>
           </a:p>
           <a:p>
-            <a:pPr marL="0" indent="0">
+            <a:pPr marL="0" indent="0" algn="just">
               <a:lnSpc>
                 <a:spcPct val="150000"/>
               </a:lnSpc>
               <a:buNone/>
             </a:pPr>
+            <a:r>
+              <a:rPr lang="es-ES" sz="3200" dirty="0"/>
+              <a:t>         1.1.1.- </a:t>
+            </a:r>
+            <a:r>
+              <a:rPr lang="es-EC" sz="3200" dirty="0"/>
+              <a:t>El juego comienza a correr en nivel 1.</a:t>
+            </a:r>
+          </a:p>
+          <a:p>
+            <a:pPr marL="0" indent="0" algn="just">
+              <a:lnSpc>
+                <a:spcPct val="150000"/>
+              </a:lnSpc>
+              <a:buNone/>
+            </a:pPr>
+            <a:r>
+              <a:rPr lang="es-EC" sz="3200" dirty="0"/>
+              <a:t>         1.1.2.- El jugador no ingresa nada por teclado.</a:t>
+            </a:r>
+          </a:p>
+          <a:p>
+            <a:pPr marL="0" indent="0" algn="just">
+              <a:lnSpc>
+                <a:spcPct val="150000"/>
+              </a:lnSpc>
+              <a:buNone/>
+            </a:pPr>
+            <a:r>
+              <a:rPr lang="es-EC" sz="3200" dirty="0"/>
+              <a:t>         1.1.3.- El jugador presiona la tecla ENTER.</a:t>
+            </a:r>
+          </a:p>
+          <a:p>
+            <a:pPr marL="0" indent="0" algn="just">
+              <a:lnSpc>
+                <a:spcPct val="150000"/>
+              </a:lnSpc>
+              <a:buNone/>
+            </a:pPr>
             <a:endParaRPr lang="es-ES" sz="3200" dirty="0"/>
           </a:p>
           <a:p>
-            <a:pPr marL="0" indent="0">
+            <a:pPr marL="0" indent="0" algn="just">
               <a:lnSpc>
                 <a:spcPct val="150000"/>
               </a:lnSpc>

</xml_diff>